<commit_message>
copied mid Term presentation
</commit_message>
<xml_diff>
--- a/presentation/Presentation_valerioMollet.pptx
+++ b/presentation/Presentation_valerioMollet.pptx
@@ -11,11 +11,11 @@
     <p:sldId id="256" r:id="rId2"/>
     <p:sldId id="305" r:id="rId3"/>
     <p:sldId id="306" r:id="rId4"/>
-    <p:sldId id="307" r:id="rId5"/>
-    <p:sldId id="308" r:id="rId6"/>
-    <p:sldId id="312" r:id="rId7"/>
-    <p:sldId id="313" r:id="rId8"/>
-    <p:sldId id="309" r:id="rId9"/>
+    <p:sldId id="315" r:id="rId5"/>
+    <p:sldId id="313" r:id="rId6"/>
+    <p:sldId id="314" r:id="rId7"/>
+    <p:sldId id="309" r:id="rId8"/>
+    <p:sldId id="307" r:id="rId9"/>
     <p:sldId id="310" r:id="rId10"/>
     <p:sldId id="311" r:id="rId11"/>
   </p:sldIdLst>
@@ -9423,7 +9423,15 @@
             </a:pPr>
             <a:r>
               <a:rPr lang="en" dirty="0"/>
-              <a:t>MIALab Projekt – Group 2</a:t>
+              <a:t>MIALab </a:t>
+            </a:r>
+            <a:r>
+              <a:rPr lang="en" dirty="0" smtClean="0"/>
+              <a:t>Project </a:t>
+            </a:r>
+            <a:r>
+              <a:rPr lang="en" dirty="0"/>
+              <a:t>– Group 2</a:t>
             </a:r>
             <a:endParaRPr dirty="0"/>
           </a:p>
@@ -17759,6 +17767,13 @@
   <p:clrMapOvr>
     <a:masterClrMapping/>
   </p:clrMapOvr>
+  <p:timing>
+    <p:tnLst>
+      <p:par>
+        <p:cTn id="1" dur="indefinite" restart="never" nodeType="tmRoot"/>
+      </p:par>
+    </p:tnLst>
+  </p:timing>
 </p:sld>
 </file>
 
@@ -17841,6 +17856,13 @@
   <p:clrMapOvr>
     <a:masterClrMapping/>
   </p:clrMapOvr>
+  <p:timing>
+    <p:tnLst>
+      <p:par>
+        <p:cTn id="1" dur="indefinite" restart="never" nodeType="tmRoot"/>
+      </p:par>
+    </p:tnLst>
+  </p:timing>
 </p:sld>
 </file>
 
@@ -17876,48 +17898,88 @@
           <a:bodyPr/>
           <a:lstStyle/>
           <a:p>
+            <a:pPr>
+              <a:spcAft>
+                <a:spcPts val="600"/>
+              </a:spcAft>
+            </a:pPr>
             <a:r>
               <a:rPr lang="en-US" dirty="0"/>
               <a:t>Hypothesis</a:t>
             </a:r>
           </a:p>
           <a:p>
+            <a:pPr>
+              <a:spcAft>
+                <a:spcPts val="600"/>
+              </a:spcAft>
+            </a:pPr>
+            <a:r>
+              <a:rPr lang="en-US" dirty="0"/>
+              <a:t>Segmentation</a:t>
+            </a:r>
+          </a:p>
+          <a:p>
+            <a:pPr>
+              <a:spcAft>
+                <a:spcPts val="600"/>
+              </a:spcAft>
+            </a:pPr>
+            <a:r>
+              <a:rPr lang="en-US" dirty="0"/>
+              <a:t>Registration</a:t>
+            </a:r>
+          </a:p>
+          <a:p>
+            <a:pPr>
+              <a:spcAft>
+                <a:spcPts val="600"/>
+              </a:spcAft>
+            </a:pPr>
+            <a:r>
+              <a:rPr lang="en-US" dirty="0"/>
+              <a:t>Preliminary results</a:t>
+            </a:r>
+          </a:p>
+          <a:p>
+            <a:pPr>
+              <a:spcAft>
+                <a:spcPts val="600"/>
+              </a:spcAft>
+            </a:pPr>
             <a:r>
               <a:rPr lang="en-US" dirty="0"/>
               <a:t>Current state</a:t>
             </a:r>
           </a:p>
           <a:p>
-            <a:r>
-              <a:rPr lang="en-US" dirty="0"/>
-              <a:t>Segmentation</a:t>
-            </a:r>
-          </a:p>
-          <a:p>
-            <a:r>
-              <a:rPr lang="en-US" dirty="0"/>
-              <a:t>Registration</a:t>
-            </a:r>
-          </a:p>
-          <a:p>
-            <a:r>
-              <a:rPr lang="en-US" dirty="0"/>
-              <a:t>Preliminary results</a:t>
-            </a:r>
-          </a:p>
-          <a:p>
+            <a:pPr>
+              <a:spcAft>
+                <a:spcPts val="600"/>
+              </a:spcAft>
+            </a:pPr>
             <a:r>
               <a:rPr lang="en-US" dirty="0"/>
               <a:t>Outlook</a:t>
             </a:r>
           </a:p>
           <a:p>
+            <a:pPr>
+              <a:spcAft>
+                <a:spcPts val="600"/>
+              </a:spcAft>
+            </a:pPr>
             <a:r>
               <a:rPr lang="en-US" dirty="0"/>
               <a:t>Questions</a:t>
             </a:r>
           </a:p>
           <a:p>
+            <a:pPr>
+              <a:spcAft>
+                <a:spcPts val="600"/>
+              </a:spcAft>
+            </a:pPr>
             <a:endParaRPr lang="fr-CH" dirty="0"/>
           </a:p>
         </p:txBody>
@@ -17954,6 +18016,13 @@
   <p:clrMapOvr>
     <a:masterClrMapping/>
   </p:clrMapOvr>
+  <p:timing>
+    <p:tnLst>
+      <p:par>
+        <p:cTn id="1" dur="indefinite" restart="never" nodeType="tmRoot"/>
+      </p:par>
+    </p:tnLst>
+  </p:timing>
 </p:sld>
 </file>
 
@@ -17989,18 +18058,33 @@
           <a:bodyPr/>
           <a:lstStyle/>
           <a:p>
+            <a:pPr>
+              <a:spcAft>
+                <a:spcPts val="600"/>
+              </a:spcAft>
+            </a:pPr>
             <a:r>
               <a:rPr lang="en-US" dirty="0"/>
               <a:t>“Atlas based segmentation consists of a powerful baseline for brain tissue segmentation when compared to an ML based approach”</a:t>
             </a:r>
           </a:p>
           <a:p>
+            <a:pPr>
+              <a:spcAft>
+                <a:spcPts val="600"/>
+              </a:spcAft>
+            </a:pPr>
             <a:r>
               <a:rPr lang="en-US" dirty="0"/>
               <a:t>Main focus on segmentation types</a:t>
             </a:r>
           </a:p>
           <a:p>
+            <a:pPr>
+              <a:spcAft>
+                <a:spcPts val="600"/>
+              </a:spcAft>
+            </a:pPr>
             <a:r>
               <a:rPr lang="en-US" dirty="0"/>
               <a:t>Segmentation depends on registration</a:t>
@@ -18044,6 +18128,13 @@
   <p:clrMapOvr>
     <a:masterClrMapping/>
   </p:clrMapOvr>
+  <p:timing>
+    <p:tnLst>
+      <p:par>
+        <p:cTn id="1" dur="indefinite" restart="never" nodeType="tmRoot"/>
+      </p:par>
+    </p:tnLst>
+  </p:timing>
 </p:sld>
 </file>
 
@@ -18079,138 +18170,14 @@
           <a:bodyPr/>
           <a:lstStyle/>
           <a:p>
-            <a:r>
-              <a:rPr lang="fr-CH" dirty="0"/>
-              <a:t>2 types of registration</a:t>
-            </a:r>
-          </a:p>
-          <a:p>
-            <a:r>
-              <a:rPr lang="fr-CH" dirty="0"/>
-              <a:t>2 types </a:t>
-            </a:r>
-            <a:r>
-              <a:rPr lang="fr-CH"/>
-              <a:t>of segmentation</a:t>
-            </a:r>
-            <a:endParaRPr lang="fr-CH" dirty="0"/>
-          </a:p>
-          <a:p>
-            <a:endParaRPr lang="fr-CH" dirty="0"/>
-          </a:p>
-          <a:p>
-            <a:r>
-              <a:rPr lang="fr-CH" dirty="0" err="1"/>
-              <a:t>What</a:t>
-            </a:r>
-            <a:r>
-              <a:rPr lang="fr-CH" dirty="0"/>
-              <a:t> </a:t>
-            </a:r>
-            <a:r>
-              <a:rPr lang="fr-CH" dirty="0" err="1"/>
-              <a:t>else</a:t>
-            </a:r>
-            <a:r>
-              <a:rPr lang="fr-CH" dirty="0"/>
-              <a:t>?</a:t>
-            </a:r>
-          </a:p>
-          <a:p>
-            <a:endParaRPr lang="fr-CH" dirty="0"/>
-          </a:p>
-        </p:txBody>
-      </p:sp>
-      <p:sp>
-        <p:nvSpPr>
-          <p:cNvPr id="3" name="Titre 2"/>
-          <p:cNvSpPr>
-            <a:spLocks noGrp="1"/>
-          </p:cNvSpPr>
-          <p:nvPr>
-            <p:ph type="title"/>
-          </p:nvPr>
-        </p:nvSpPr>
-        <p:spPr/>
-        <p:txBody>
-          <a:bodyPr/>
-          <a:lstStyle/>
-          <a:p>
-            <a:r>
-              <a:rPr lang="fr-CH" dirty="0" err="1"/>
-              <a:t>Current</a:t>
-            </a:r>
-            <a:r>
-              <a:rPr lang="fr-CH" dirty="0"/>
-              <a:t> state</a:t>
-            </a:r>
-          </a:p>
-        </p:txBody>
-      </p:sp>
-    </p:spTree>
-    <p:extLst>
-      <p:ext uri="{BB962C8B-B14F-4D97-AF65-F5344CB8AC3E}">
-        <p14:creationId xmlns:p14="http://schemas.microsoft.com/office/powerpoint/2010/main" val="2982305108"/>
-      </p:ext>
-    </p:extLst>
-  </p:cSld>
-  <p:clrMapOvr>
-    <a:masterClrMapping/>
-  </p:clrMapOvr>
-</p:sld>
-</file>
-
-<file path=ppt/slides/slide5.xml><?xml version="1.0" encoding="utf-8"?>
-<p:sld xmlns:a="http://schemas.openxmlformats.org/drawingml/2006/main" xmlns:r="http://schemas.openxmlformats.org/officeDocument/2006/relationships" xmlns:p="http://schemas.openxmlformats.org/presentationml/2006/main">
-  <p:cSld>
-    <p:spTree>
-      <p:nvGrpSpPr>
-        <p:cNvPr id="1" name=""/>
-        <p:cNvGrpSpPr/>
-        <p:nvPr/>
-      </p:nvGrpSpPr>
-      <p:grpSpPr>
-        <a:xfrm>
-          <a:off x="0" y="0"/>
-          <a:ext cx="0" cy="0"/>
-          <a:chOff x="0" y="0"/>
-          <a:chExt cx="0" cy="0"/>
-        </a:xfrm>
-      </p:grpSpPr>
-      <p:sp>
-        <p:nvSpPr>
-          <p:cNvPr id="2" name="Espace réservé du texte 1"/>
-          <p:cNvSpPr>
-            <a:spLocks noGrp="1"/>
-          </p:cNvSpPr>
-          <p:nvPr>
-            <p:ph type="body" idx="1"/>
-          </p:nvPr>
-        </p:nvSpPr>
-        <p:spPr/>
-        <p:txBody>
-          <a:bodyPr/>
-          <a:lstStyle/>
-          <a:p>
-            <a:r>
-              <a:rPr lang="fr-CH" dirty="0"/>
-              <a:t>Machine </a:t>
-            </a:r>
-            <a:r>
-              <a:rPr lang="fr-CH" dirty="0" err="1"/>
-              <a:t>learning</a:t>
-            </a:r>
-            <a:endParaRPr lang="fr-CH" dirty="0"/>
-          </a:p>
-          <a:p>
-            <a:pPr lvl="1">
-              <a:spcBef>
-                <a:spcPts val="0"/>
-              </a:spcBef>
+            <a:pPr>
+              <a:spcAft>
+                <a:spcPts val="600"/>
+              </a:spcAft>
             </a:pPr>
             <a:r>
-              <a:rPr lang="fr-CH" dirty="0"/>
-              <a:t>…</a:t>
+              <a:rPr lang="en-GB" dirty="0" smtClean="0"/>
+              <a:t>Machine learning</a:t>
             </a:r>
           </a:p>
           <a:p>
@@ -18218,29 +18185,24 @@
               <a:spcBef>
                 <a:spcPts val="0"/>
               </a:spcBef>
+              <a:spcAft>
+                <a:spcPts val="600"/>
+              </a:spcAft>
             </a:pPr>
-            <a:endParaRPr lang="fr-CH" dirty="0"/>
+            <a:r>
+              <a:rPr lang="en-GB" dirty="0" smtClean="0"/>
+              <a:t>Decision forest </a:t>
+            </a:r>
           </a:p>
           <a:p>
-            <a:r>
-              <a:rPr lang="fr-CH" dirty="0"/>
-              <a:t>Atlas-</a:t>
-            </a:r>
-            <a:r>
-              <a:rPr lang="fr-CH" dirty="0" err="1"/>
-              <a:t>based</a:t>
-            </a:r>
-            <a:endParaRPr lang="fr-CH" dirty="0"/>
-          </a:p>
-          <a:p>
-            <a:pPr lvl="1">
-              <a:spcBef>
-                <a:spcPts val="0"/>
-              </a:spcBef>
+            <a:pPr>
+              <a:spcAft>
+                <a:spcPts val="600"/>
+              </a:spcAft>
             </a:pPr>
             <a:r>
-              <a:rPr lang="fr-CH" dirty="0"/>
-              <a:t>…</a:t>
+              <a:rPr lang="en-GB" dirty="0" smtClean="0"/>
+              <a:t>Atlas-based</a:t>
             </a:r>
           </a:p>
           <a:p>
@@ -18248,8 +18210,71 @@
               <a:spcBef>
                 <a:spcPts val="0"/>
               </a:spcBef>
+              <a:spcAft>
+                <a:spcPts val="600"/>
+              </a:spcAft>
             </a:pPr>
-            <a:endParaRPr lang="fr-CH" dirty="0"/>
+            <a:r>
+              <a:rPr lang="en-GB" dirty="0" smtClean="0"/>
+              <a:t>Single atlas</a:t>
+            </a:r>
+          </a:p>
+          <a:p>
+            <a:pPr lvl="1">
+              <a:spcBef>
+                <a:spcPts val="0"/>
+              </a:spcBef>
+              <a:spcAft>
+                <a:spcPts val="600"/>
+              </a:spcAft>
+            </a:pPr>
+            <a:r>
+              <a:rPr lang="en-GB" dirty="0" smtClean="0"/>
+              <a:t>Multi-atlas</a:t>
+            </a:r>
+          </a:p>
+          <a:p>
+            <a:pPr lvl="2">
+              <a:spcBef>
+                <a:spcPts val="0"/>
+              </a:spcBef>
+              <a:spcAft>
+                <a:spcPts val="600"/>
+              </a:spcAft>
+            </a:pPr>
+            <a:r>
+              <a:rPr lang="en-GB" dirty="0" smtClean="0"/>
+              <a:t>Majority voting</a:t>
+            </a:r>
+          </a:p>
+          <a:p>
+            <a:pPr lvl="2">
+              <a:spcBef>
+                <a:spcPts val="0"/>
+              </a:spcBef>
+              <a:spcAft>
+                <a:spcPts val="600"/>
+              </a:spcAft>
+            </a:pPr>
+            <a:r>
+              <a:rPr lang="en-GB" dirty="0" smtClean="0"/>
+              <a:t>Global/local weighted voting</a:t>
+            </a:r>
+          </a:p>
+          <a:p>
+            <a:pPr lvl="2">
+              <a:spcBef>
+                <a:spcPts val="0"/>
+              </a:spcBef>
+              <a:spcAft>
+                <a:spcPts val="600"/>
+              </a:spcAft>
+            </a:pPr>
+            <a:r>
+              <a:rPr lang="en-GB" dirty="0" smtClean="0"/>
+              <a:t>Shape-based averaging</a:t>
+            </a:r>
+            <a:endParaRPr lang="en-GB" dirty="0"/>
           </a:p>
         </p:txBody>
       </p:sp>
@@ -18287,17 +18312,24 @@
     </p:spTree>
     <p:extLst>
       <p:ext uri="{BB962C8B-B14F-4D97-AF65-F5344CB8AC3E}">
-        <p14:creationId xmlns:p14="http://schemas.microsoft.com/office/powerpoint/2010/main" val="2210037138"/>
+        <p14:creationId xmlns:p14="http://schemas.microsoft.com/office/powerpoint/2010/main" val="431237675"/>
       </p:ext>
     </p:extLst>
   </p:cSld>
   <p:clrMapOvr>
     <a:masterClrMapping/>
   </p:clrMapOvr>
+  <p:timing>
+    <p:tnLst>
+      <p:par>
+        <p:cTn id="1" dur="indefinite" restart="never" nodeType="tmRoot"/>
+      </p:par>
+    </p:tnLst>
+  </p:timing>
 </p:sld>
 </file>
 
-<file path=ppt/slides/slide6.xml><?xml version="1.0" encoding="utf-8"?>
+<file path=ppt/slides/slide5.xml><?xml version="1.0" encoding="utf-8"?>
 <p:sld xmlns:a="http://schemas.openxmlformats.org/drawingml/2006/main" xmlns:r="http://schemas.openxmlformats.org/officeDocument/2006/relationships" xmlns:p="http://schemas.openxmlformats.org/presentationml/2006/main">
   <p:cSld>
     <p:spTree>
@@ -18334,106 +18366,98 @@
           <a:bodyPr/>
           <a:lstStyle/>
           <a:p>
+            <a:pPr>
+              <a:spcAft>
+                <a:spcPts val="600"/>
+              </a:spcAft>
+            </a:pPr>
             <a:r>
-              <a:rPr lang="fr-CH" dirty="0"/>
+              <a:rPr lang="en-GB" dirty="0" smtClean="0"/>
               <a:t>Affine</a:t>
             </a:r>
           </a:p>
           <a:p>
-            <a:pPr lvl="1"/>
-            <a:r>
-              <a:rPr lang="fr-CH" dirty="0"/>
-              <a:t>Rotation, Translation and </a:t>
-            </a:r>
-            <a:r>
-              <a:rPr lang="fr-CH" dirty="0" err="1"/>
-              <a:t>Scaling</a:t>
-            </a:r>
-            <a:endParaRPr lang="fr-CH" dirty="0"/>
-          </a:p>
-          <a:p>
-            <a:pPr lvl="1"/>
-            <a:r>
-              <a:rPr lang="fr-CH" dirty="0" err="1"/>
-              <a:t>Already</a:t>
-            </a:r>
-            <a:r>
-              <a:rPr lang="fr-CH" dirty="0"/>
-              <a:t> </a:t>
-            </a:r>
-            <a:r>
-              <a:rPr lang="fr-CH" dirty="0" err="1"/>
-              <a:t>existed</a:t>
-            </a:r>
-            <a:endParaRPr lang="fr-CH" dirty="0"/>
-          </a:p>
-          <a:p>
-            <a:pPr marL="584200" lvl="1" indent="0">
+            <a:pPr lvl="1">
               <a:spcBef>
                 <a:spcPts val="0"/>
               </a:spcBef>
-              <a:buNone/>
+              <a:spcAft>
+                <a:spcPts val="600"/>
+              </a:spcAft>
             </a:pPr>
-            <a:endParaRPr lang="fr-CH" dirty="0"/>
-          </a:p>
-          <a:p>
             <a:r>
-              <a:rPr lang="fr-CH" dirty="0"/>
-              <a:t>Non-</a:t>
-            </a:r>
-            <a:r>
-              <a:rPr lang="fr-CH" dirty="0" err="1"/>
-              <a:t>rigid</a:t>
-            </a:r>
-            <a:endParaRPr lang="fr-CH" dirty="0"/>
-          </a:p>
-          <a:p>
-            <a:pPr lvl="1"/>
-            <a:r>
-              <a:rPr lang="fr-CH" dirty="0" err="1"/>
-              <a:t>Compansate</a:t>
-            </a:r>
-            <a:r>
-              <a:rPr lang="fr-CH" dirty="0"/>
-              <a:t> free </a:t>
-            </a:r>
-            <a:r>
-              <a:rPr lang="fr-CH" dirty="0" err="1"/>
-              <a:t>form</a:t>
-            </a:r>
-            <a:r>
-              <a:rPr lang="fr-CH" dirty="0"/>
-              <a:t> </a:t>
-            </a:r>
-            <a:r>
-              <a:rPr lang="fr-CH" dirty="0" err="1"/>
-              <a:t>deformation</a:t>
-            </a:r>
-            <a:endParaRPr lang="fr-CH" dirty="0"/>
-          </a:p>
-          <a:p>
-            <a:pPr lvl="1"/>
-            <a:r>
-              <a:rPr lang="fr-CH" dirty="0"/>
-              <a:t>B-</a:t>
-            </a:r>
-            <a:r>
-              <a:rPr lang="fr-CH" dirty="0" err="1"/>
-              <a:t>Spline</a:t>
-            </a:r>
-            <a:r>
-              <a:rPr lang="fr-CH" dirty="0"/>
-              <a:t> Registration</a:t>
+              <a:rPr lang="en-GB" dirty="0" smtClean="0"/>
+              <a:t>Rotation, Translation and Scaling</a:t>
             </a:r>
           </a:p>
           <a:p>
-            <a:pPr lvl="1"/>
+            <a:pPr lvl="1">
+              <a:spcBef>
+                <a:spcPts val="0"/>
+              </a:spcBef>
+              <a:spcAft>
+                <a:spcPts val="600"/>
+              </a:spcAft>
+            </a:pPr>
             <a:r>
-              <a:rPr lang="fr-CH" u="sng" dirty="0" err="1"/>
+              <a:rPr lang="en-GB" dirty="0" smtClean="0"/>
+              <a:t>Already existed</a:t>
+            </a:r>
+          </a:p>
+          <a:p>
+            <a:pPr>
+              <a:spcAft>
+                <a:spcPts val="600"/>
+              </a:spcAft>
+            </a:pPr>
+            <a:r>
+              <a:rPr lang="en-GB" dirty="0" smtClean="0"/>
+              <a:t>Non-rigid</a:t>
+            </a:r>
+          </a:p>
+          <a:p>
+            <a:pPr lvl="1">
+              <a:spcBef>
+                <a:spcPts val="0"/>
+              </a:spcBef>
+              <a:spcAft>
+                <a:spcPts val="600"/>
+              </a:spcAft>
+            </a:pPr>
+            <a:r>
+              <a:rPr lang="en-GB" dirty="0" smtClean="0"/>
+              <a:t>Compensate free form deformation</a:t>
+            </a:r>
+          </a:p>
+          <a:p>
+            <a:pPr lvl="1">
+              <a:spcBef>
+                <a:spcPts val="0"/>
+              </a:spcBef>
+              <a:spcAft>
+                <a:spcPts val="600"/>
+              </a:spcAft>
+            </a:pPr>
+            <a:r>
+              <a:rPr lang="en-GB" dirty="0" smtClean="0"/>
+              <a:t>B-Spline Registration</a:t>
+            </a:r>
+          </a:p>
+          <a:p>
+            <a:pPr lvl="1">
+              <a:spcBef>
+                <a:spcPts val="0"/>
+              </a:spcBef>
+              <a:spcAft>
+                <a:spcPts val="600"/>
+              </a:spcAft>
+            </a:pPr>
+            <a:r>
+              <a:rPr lang="en-GB" u="sng" dirty="0" err="1" smtClean="0"/>
               <a:t>SimpleElastix</a:t>
             </a:r>
             <a:r>
-              <a:rPr lang="fr-CH" u="sng" dirty="0"/>
+              <a:rPr lang="en-GB" u="sng" dirty="0" smtClean="0"/>
               <a:t> Library</a:t>
             </a:r>
           </a:p>
@@ -18443,7 +18467,7 @@
                 <a:spcPts val="0"/>
               </a:spcBef>
             </a:pPr>
-            <a:endParaRPr lang="fr-CH" dirty="0"/>
+            <a:endParaRPr lang="en-GB" dirty="0"/>
           </a:p>
         </p:txBody>
       </p:sp>
@@ -18481,17 +18505,24 @@
     </p:spTree>
     <p:extLst>
       <p:ext uri="{BB962C8B-B14F-4D97-AF65-F5344CB8AC3E}">
-        <p14:creationId xmlns:p14="http://schemas.microsoft.com/office/powerpoint/2010/main" val="2745918339"/>
+        <p14:creationId xmlns:p14="http://schemas.microsoft.com/office/powerpoint/2010/main" val="1039378176"/>
       </p:ext>
     </p:extLst>
   </p:cSld>
   <p:clrMapOvr>
     <a:masterClrMapping/>
   </p:clrMapOvr>
+  <p:timing>
+    <p:tnLst>
+      <p:par>
+        <p:cTn id="1" dur="indefinite" restart="never" nodeType="tmRoot"/>
+      </p:par>
+    </p:tnLst>
+  </p:timing>
 </p:sld>
 </file>
 
-<file path=ppt/slides/slide7.xml><?xml version="1.0" encoding="utf-8"?>
+<file path=ppt/slides/slide6.xml><?xml version="1.0" encoding="utf-8"?>
 <p:sld xmlns:a="http://schemas.openxmlformats.org/drawingml/2006/main" xmlns:r="http://schemas.openxmlformats.org/officeDocument/2006/relationships" xmlns:p="http://schemas.openxmlformats.org/presentationml/2006/main">
   <p:cSld>
     <p:spTree>
@@ -18539,70 +18570,12 @@
           </a:p>
         </p:txBody>
       </p:sp>
-      <p:pic>
-        <p:nvPicPr>
-          <p:cNvPr id="9" name="Grafik 8">
-            <a:extLst>
-              <a:ext uri="{FF2B5EF4-FFF2-40B4-BE49-F238E27FC236}">
-                <a16:creationId xmlns:a16="http://schemas.microsoft.com/office/drawing/2014/main" id="{AF8B2320-66D0-48A1-94D9-CDA739EB6C6E}"/>
-              </a:ext>
-            </a:extLst>
-          </p:cNvPr>
-          <p:cNvPicPr>
-            <a:picLocks noChangeAspect="1"/>
-          </p:cNvPicPr>
-          <p:nvPr/>
-        </p:nvPicPr>
-        <p:blipFill rotWithShape="1">
-          <a:blip r:embed="rId2"/>
-          <a:srcRect l="27022" t="11890" r="24396" b="10729"/>
-          <a:stretch/>
-        </p:blipFill>
-        <p:spPr>
-          <a:xfrm>
-            <a:off x="5309668" y="1406177"/>
-            <a:ext cx="2843093" cy="3396343"/>
-          </a:xfrm>
-          <a:prstGeom prst="rect">
-            <a:avLst/>
-          </a:prstGeom>
-        </p:spPr>
-      </p:pic>
-      <p:pic>
-        <p:nvPicPr>
-          <p:cNvPr id="11" name="Grafik 10">
-            <a:extLst>
-              <a:ext uri="{FF2B5EF4-FFF2-40B4-BE49-F238E27FC236}">
-                <a16:creationId xmlns:a16="http://schemas.microsoft.com/office/drawing/2014/main" id="{5BAC95D5-9EC9-401A-8FF5-EE26E3A7DB7A}"/>
-              </a:ext>
-            </a:extLst>
-          </p:cNvPr>
-          <p:cNvPicPr>
-            <a:picLocks noChangeAspect="1"/>
-          </p:cNvPicPr>
-          <p:nvPr/>
-        </p:nvPicPr>
-        <p:blipFill rotWithShape="1">
-          <a:blip r:embed="rId3"/>
-          <a:srcRect l="27023" t="11367" r="24395" b="11251"/>
-          <a:stretch/>
-        </p:blipFill>
-        <p:spPr>
-          <a:xfrm>
-            <a:off x="672349" y="1406176"/>
-            <a:ext cx="2843093" cy="3396344"/>
-          </a:xfrm>
-          <a:prstGeom prst="rect">
-            <a:avLst/>
-          </a:prstGeom>
-        </p:spPr>
-      </p:pic>
       <p:sp>
         <p:nvSpPr>
           <p:cNvPr id="12" name="Textfeld 11">
             <a:extLst>
               <a:ext uri="{FF2B5EF4-FFF2-40B4-BE49-F238E27FC236}">
-                <a16:creationId xmlns:a16="http://schemas.microsoft.com/office/drawing/2014/main" id="{6FBAE4E7-3A3E-415A-8FC6-165BDB05ADF1}"/>
+                <a16:creationId xmlns:a16="http://schemas.microsoft.com/office/drawing/2014/main" xmlns="" id="{6FBAE4E7-3A3E-415A-8FC6-165BDB05ADF1}"/>
               </a:ext>
             </a:extLst>
           </p:cNvPr>
@@ -18659,7 +18632,7 @@
               </a:rPr>
               <a:t>Registration</a:t>
             </a:r>
-            <a:endParaRPr lang="en-CH" sz="1600" dirty="0">
+            <a:endParaRPr lang="aa-ET" sz="1600" dirty="0">
               <a:solidFill>
                 <a:schemeClr val="dk1"/>
               </a:solidFill>
@@ -18673,7 +18646,7 @@
           <p:cNvPr id="14" name="Textfeld 13">
             <a:extLst>
               <a:ext uri="{FF2B5EF4-FFF2-40B4-BE49-F238E27FC236}">
-                <a16:creationId xmlns:a16="http://schemas.microsoft.com/office/drawing/2014/main" id="{672DD57D-91A9-4F21-9981-CDDB90B625C7}"/>
+                <a16:creationId xmlns:a16="http://schemas.microsoft.com/office/drawing/2014/main" xmlns="" id="{672DD57D-91A9-4F21-9981-CDDB90B625C7}"/>
               </a:ext>
             </a:extLst>
           </p:cNvPr>
@@ -18706,7 +18679,7 @@
               </a:rPr>
               <a:t>Affine Registration</a:t>
             </a:r>
-            <a:endParaRPr lang="en-CH" sz="1600" dirty="0">
+            <a:endParaRPr lang="aa-ET" sz="1600" dirty="0">
               <a:solidFill>
                 <a:schemeClr val="dk1"/>
               </a:solidFill>
@@ -18716,20 +18689,85 @@
           </a:p>
         </p:txBody>
       </p:sp>
+      <p:pic>
+        <p:nvPicPr>
+          <p:cNvPr id="4" name="Grafik 3">
+            <a:extLst>
+              <a:ext uri="{FF2B5EF4-FFF2-40B4-BE49-F238E27FC236}">
+                <a16:creationId xmlns:a16="http://schemas.microsoft.com/office/drawing/2014/main" xmlns="" id="{7E3AF0D3-7CCB-49C7-8201-E4D490CA2181}"/>
+              </a:ext>
+            </a:extLst>
+          </p:cNvPr>
+          <p:cNvPicPr>
+            <a:picLocks noChangeAspect="1"/>
+          </p:cNvPicPr>
+          <p:nvPr/>
+        </p:nvPicPr>
+        <p:blipFill rotWithShape="1">
+          <a:blip r:embed="rId2"/>
+          <a:srcRect l="27259" t="12941" r="24160" b="11014"/>
+          <a:stretch/>
+        </p:blipFill>
+        <p:spPr>
+          <a:xfrm>
+            <a:off x="5409557" y="1487827"/>
+            <a:ext cx="2843095" cy="3337752"/>
+          </a:xfrm>
+          <a:prstGeom prst="rect">
+            <a:avLst/>
+          </a:prstGeom>
+        </p:spPr>
+      </p:pic>
+      <p:pic>
+        <p:nvPicPr>
+          <p:cNvPr id="6" name="Grafik 5">
+            <a:extLst>
+              <a:ext uri="{FF2B5EF4-FFF2-40B4-BE49-F238E27FC236}">
+                <a16:creationId xmlns:a16="http://schemas.microsoft.com/office/drawing/2014/main" xmlns="" id="{ADE48117-B4F3-4EC6-BD89-D1CD35CC7B8F}"/>
+              </a:ext>
+            </a:extLst>
+          </p:cNvPr>
+          <p:cNvPicPr>
+            <a:picLocks noChangeAspect="1"/>
+          </p:cNvPicPr>
+          <p:nvPr/>
+        </p:nvPicPr>
+        <p:blipFill rotWithShape="1">
+          <a:blip r:embed="rId3"/>
+          <a:srcRect l="27042" t="12259" r="24376" b="11695"/>
+          <a:stretch/>
+        </p:blipFill>
+        <p:spPr>
+          <a:xfrm>
+            <a:off x="672348" y="1487827"/>
+            <a:ext cx="2843094" cy="3337752"/>
+          </a:xfrm>
+          <a:prstGeom prst="rect">
+            <a:avLst/>
+          </a:prstGeom>
+        </p:spPr>
+      </p:pic>
     </p:spTree>
     <p:extLst>
       <p:ext uri="{BB962C8B-B14F-4D97-AF65-F5344CB8AC3E}">
-        <p14:creationId xmlns:p14="http://schemas.microsoft.com/office/powerpoint/2010/main" val="2957098800"/>
+        <p14:creationId xmlns:p14="http://schemas.microsoft.com/office/powerpoint/2010/main" val="3272507595"/>
       </p:ext>
     </p:extLst>
   </p:cSld>
   <p:clrMapOvr>
     <a:masterClrMapping/>
   </p:clrMapOvr>
+  <p:timing>
+    <p:tnLst>
+      <p:par>
+        <p:cTn id="1" dur="indefinite" restart="never" nodeType="tmRoot"/>
+      </p:par>
+    </p:tnLst>
+  </p:timing>
 </p:sld>
 </file>
 
-<file path=ppt/slides/slide8.xml><?xml version="1.0" encoding="utf-8"?>
+<file path=ppt/slides/slide7.xml><?xml version="1.0" encoding="utf-8"?>
 <p:sld xmlns:a="http://schemas.openxmlformats.org/drawingml/2006/main" xmlns:r="http://schemas.openxmlformats.org/officeDocument/2006/relationships" xmlns:p="http://schemas.openxmlformats.org/presentationml/2006/main">
   <p:cSld>
     <p:spTree>
@@ -18761,17 +18799,42 @@
           <a:bodyPr/>
           <a:lstStyle/>
           <a:p>
-            <a:r>
-              <a:rPr lang="fr-CH" dirty="0" err="1"/>
-              <a:t>Boxplot</a:t>
-            </a:r>
-            <a:r>
-              <a:rPr lang="fr-CH" dirty="0"/>
-              <a:t> graph + short discussion</a:t>
-            </a:r>
+            <a:endParaRPr lang="fr-CH" dirty="0"/>
           </a:p>
         </p:txBody>
       </p:sp>
+      <p:pic>
+        <p:nvPicPr>
+          <p:cNvPr id="4" name="Image 3"/>
+          <p:cNvPicPr>
+            <a:picLocks noChangeAspect="1"/>
+          </p:cNvPicPr>
+          <p:nvPr/>
+        </p:nvPicPr>
+        <p:blipFill rotWithShape="1">
+          <a:blip r:embed="rId2">
+            <a:extLst>
+              <a:ext uri="{28A0092B-C50C-407E-A947-70E740481C1C}">
+                <a14:useLocalDpi xmlns:a14="http://schemas.microsoft.com/office/drawing/2010/main" val="0"/>
+              </a:ext>
+            </a:extLst>
+          </a:blip>
+          <a:srcRect l="7545" t="8628" r="8766" b="3934"/>
+          <a:stretch/>
+        </p:blipFill>
+        <p:spPr>
+          <a:xfrm>
+            <a:off x="672349" y="1014977"/>
+            <a:ext cx="6322339" cy="4128524"/>
+          </a:xfrm>
+          <a:prstGeom prst="rect">
+            <a:avLst/>
+          </a:prstGeom>
+          <a:effectLst>
+            <a:softEdge rad="31750"/>
+          </a:effectLst>
+        </p:spPr>
+      </p:pic>
       <p:sp>
         <p:nvSpPr>
           <p:cNvPr id="3" name="Titre 2"/>
@@ -18813,6 +18876,189 @@
   <p:clrMapOvr>
     <a:masterClrMapping/>
   </p:clrMapOvr>
+  <p:timing>
+    <p:tnLst>
+      <p:par>
+        <p:cTn id="1" dur="indefinite" restart="never" nodeType="tmRoot"/>
+      </p:par>
+    </p:tnLst>
+  </p:timing>
+</p:sld>
+</file>
+
+<file path=ppt/slides/slide8.xml><?xml version="1.0" encoding="utf-8"?>
+<p:sld xmlns:a="http://schemas.openxmlformats.org/drawingml/2006/main" xmlns:r="http://schemas.openxmlformats.org/officeDocument/2006/relationships" xmlns:p="http://schemas.openxmlformats.org/presentationml/2006/main">
+  <p:cSld>
+    <p:spTree>
+      <p:nvGrpSpPr>
+        <p:cNvPr id="1" name=""/>
+        <p:cNvGrpSpPr/>
+        <p:nvPr/>
+      </p:nvGrpSpPr>
+      <p:grpSpPr>
+        <a:xfrm>
+          <a:off x="0" y="0"/>
+          <a:ext cx="0" cy="0"/>
+          <a:chOff x="0" y="0"/>
+          <a:chExt cx="0" cy="0"/>
+        </a:xfrm>
+      </p:grpSpPr>
+      <p:sp>
+        <p:nvSpPr>
+          <p:cNvPr id="2" name="Espace réservé du texte 1"/>
+          <p:cNvSpPr>
+            <a:spLocks noGrp="1"/>
+          </p:cNvSpPr>
+          <p:nvPr>
+            <p:ph type="body" idx="1"/>
+          </p:nvPr>
+        </p:nvSpPr>
+        <p:spPr/>
+        <p:txBody>
+          <a:bodyPr/>
+          <a:lstStyle/>
+          <a:p>
+            <a:pPr>
+              <a:spcAft>
+                <a:spcPts val="600"/>
+              </a:spcAft>
+            </a:pPr>
+            <a:r>
+              <a:rPr lang="en-US" dirty="0"/>
+              <a:t>Implementation of non-rigid registration</a:t>
+            </a:r>
+          </a:p>
+          <a:p>
+            <a:pPr>
+              <a:spcAft>
+                <a:spcPts val="600"/>
+              </a:spcAft>
+            </a:pPr>
+            <a:r>
+              <a:rPr lang="en-US" dirty="0"/>
+              <a:t>Implementation of majority voting atlas-based segmentation</a:t>
+            </a:r>
+          </a:p>
+          <a:p>
+            <a:pPr>
+              <a:spcAft>
+                <a:spcPts val="600"/>
+              </a:spcAft>
+            </a:pPr>
+            <a:r>
+              <a:rPr lang="en-US" dirty="0"/>
+              <a:t>Comparison of the four different solution</a:t>
+            </a:r>
+          </a:p>
+          <a:p>
+            <a:pPr lvl="1">
+              <a:spcBef>
+                <a:spcPts val="0"/>
+              </a:spcBef>
+              <a:spcAft>
+                <a:spcPts val="600"/>
+              </a:spcAft>
+            </a:pPr>
+            <a:r>
+              <a:rPr lang="en-US" dirty="0"/>
+              <a:t>ML-based segmentation with affine registration</a:t>
+            </a:r>
+          </a:p>
+          <a:p>
+            <a:pPr lvl="1">
+              <a:spcBef>
+                <a:spcPts val="0"/>
+              </a:spcBef>
+              <a:spcAft>
+                <a:spcPts val="600"/>
+              </a:spcAft>
+            </a:pPr>
+            <a:r>
+              <a:rPr lang="en-US" dirty="0"/>
+              <a:t>ML-based segmentation with non-rigid registration</a:t>
+            </a:r>
+          </a:p>
+          <a:p>
+            <a:pPr lvl="1">
+              <a:spcBef>
+                <a:spcPts val="0"/>
+              </a:spcBef>
+              <a:spcAft>
+                <a:spcPts val="600"/>
+              </a:spcAft>
+            </a:pPr>
+            <a:r>
+              <a:rPr lang="en-US" dirty="0"/>
+              <a:t>Atlas-based segmentation with affine registration</a:t>
+            </a:r>
+          </a:p>
+          <a:p>
+            <a:pPr lvl="1">
+              <a:spcBef>
+                <a:spcPts val="0"/>
+              </a:spcBef>
+              <a:spcAft>
+                <a:spcPts val="600"/>
+              </a:spcAft>
+            </a:pPr>
+            <a:r>
+              <a:rPr lang="en-US" dirty="0"/>
+              <a:t>Atlas-based segmentation with non-rigid registration</a:t>
+            </a:r>
+          </a:p>
+          <a:p>
+            <a:pPr>
+              <a:spcAft>
+                <a:spcPts val="600"/>
+              </a:spcAft>
+            </a:pPr>
+            <a:endParaRPr lang="fr-CH" dirty="0"/>
+          </a:p>
+        </p:txBody>
+      </p:sp>
+      <p:sp>
+        <p:nvSpPr>
+          <p:cNvPr id="3" name="Titre 2"/>
+          <p:cNvSpPr>
+            <a:spLocks noGrp="1"/>
+          </p:cNvSpPr>
+          <p:nvPr>
+            <p:ph type="title"/>
+          </p:nvPr>
+        </p:nvSpPr>
+        <p:spPr/>
+        <p:txBody>
+          <a:bodyPr/>
+          <a:lstStyle/>
+          <a:p>
+            <a:r>
+              <a:rPr lang="fr-CH" dirty="0" err="1"/>
+              <a:t>Current</a:t>
+            </a:r>
+            <a:r>
+              <a:rPr lang="fr-CH" dirty="0"/>
+              <a:t> state</a:t>
+            </a:r>
+          </a:p>
+        </p:txBody>
+      </p:sp>
+    </p:spTree>
+    <p:extLst>
+      <p:ext uri="{BB962C8B-B14F-4D97-AF65-F5344CB8AC3E}">
+        <p14:creationId xmlns:p14="http://schemas.microsoft.com/office/powerpoint/2010/main" val="2982305108"/>
+      </p:ext>
+    </p:extLst>
+  </p:cSld>
+  <p:clrMapOvr>
+    <a:masterClrMapping/>
+  </p:clrMapOvr>
+  <p:timing>
+    <p:tnLst>
+      <p:par>
+        <p:cTn id="1" dur="indefinite" restart="never" nodeType="tmRoot"/>
+      </p:par>
+    </p:tnLst>
+  </p:timing>
 </p:sld>
 </file>
 
@@ -18848,17 +19094,88 @@
           <a:bodyPr/>
           <a:lstStyle/>
           <a:p>
+            <a:pPr>
+              <a:spcAft>
+                <a:spcPts val="600"/>
+              </a:spcAft>
+            </a:pPr>
             <a:r>
-              <a:rPr lang="fr-CH"/>
-              <a:t>More Altas building techniques</a:t>
+              <a:rPr lang="en-GB" dirty="0"/>
+              <a:t>More </a:t>
+            </a:r>
+            <a:r>
+              <a:rPr lang="en-GB" dirty="0" err="1"/>
+              <a:t>altas</a:t>
+            </a:r>
+            <a:r>
+              <a:rPr lang="en-GB" dirty="0"/>
+              <a:t> building techniques</a:t>
             </a:r>
           </a:p>
           <a:p>
+            <a:pPr>
+              <a:spcAft>
+                <a:spcPts val="600"/>
+              </a:spcAft>
+            </a:pPr>
             <a:r>
-              <a:rPr lang="fr-CH"/>
+              <a:rPr lang="en-GB" dirty="0"/>
               <a:t>More ML segmentation types</a:t>
             </a:r>
-            <a:endParaRPr lang="fr-CH" dirty="0"/>
+          </a:p>
+          <a:p>
+            <a:pPr>
+              <a:spcAft>
+                <a:spcPts val="600"/>
+              </a:spcAft>
+            </a:pPr>
+            <a:r>
+              <a:rPr lang="en-GB" dirty="0" err="1"/>
+              <a:t>Uniformize</a:t>
+            </a:r>
+            <a:r>
+              <a:rPr lang="en-GB" dirty="0"/>
+              <a:t> result plot</a:t>
+            </a:r>
+          </a:p>
+          <a:p>
+            <a:pPr>
+              <a:spcAft>
+                <a:spcPts val="600"/>
+              </a:spcAft>
+            </a:pPr>
+            <a:r>
+              <a:rPr lang="en-GB" dirty="0"/>
+              <a:t>Eventually hybrid solution</a:t>
+            </a:r>
+          </a:p>
+          <a:p>
+            <a:pPr lvl="1">
+              <a:spcBef>
+                <a:spcPts val="0"/>
+              </a:spcBef>
+              <a:spcAft>
+                <a:spcPts val="600"/>
+              </a:spcAft>
+            </a:pPr>
+            <a:r>
+              <a:rPr lang="en-GB" dirty="0"/>
+              <a:t>ML for grey and white matter</a:t>
+            </a:r>
+          </a:p>
+          <a:p>
+            <a:pPr lvl="1">
+              <a:spcBef>
+                <a:spcPts val="0"/>
+              </a:spcBef>
+              <a:spcAft>
+                <a:spcPts val="600"/>
+              </a:spcAft>
+            </a:pPr>
+            <a:r>
+              <a:rPr lang="en-GB" dirty="0"/>
+              <a:t>Atlas for amygdala, hippocampus and thalamus</a:t>
+            </a:r>
           </a:p>
         </p:txBody>
       </p:sp>
@@ -18894,6 +19211,13 @@
   <p:clrMapOvr>
     <a:masterClrMapping/>
   </p:clrMapOvr>
+  <p:timing>
+    <p:tnLst>
+      <p:par>
+        <p:cTn id="1" dur="indefinite" restart="never" nodeType="tmRoot"/>
+      </p:par>
+    </p:tnLst>
+  </p:timing>
 </p:sld>
 </file>
 

</xml_diff>

<commit_message>
first draft final presentation valerio
</commit_message>
<xml_diff>
--- a/presentation/Presentation_valerioMollet.pptx
+++ b/presentation/Presentation_valerioMollet.pptx
@@ -5,34 +5,30 @@
     <p:sldMasterId id="2147483672" r:id="rId1"/>
   </p:sldMasterIdLst>
   <p:notesMasterIdLst>
-    <p:notesMasterId r:id="rId12"/>
+    <p:notesMasterId r:id="rId8"/>
   </p:notesMasterIdLst>
   <p:sldIdLst>
     <p:sldId id="256" r:id="rId2"/>
-    <p:sldId id="305" r:id="rId3"/>
-    <p:sldId id="306" r:id="rId4"/>
-    <p:sldId id="315" r:id="rId5"/>
+    <p:sldId id="317" r:id="rId3"/>
+    <p:sldId id="318" r:id="rId4"/>
+    <p:sldId id="319" r:id="rId5"/>
     <p:sldId id="313" r:id="rId6"/>
     <p:sldId id="314" r:id="rId7"/>
-    <p:sldId id="309" r:id="rId8"/>
-    <p:sldId id="307" r:id="rId9"/>
-    <p:sldId id="310" r:id="rId10"/>
-    <p:sldId id="311" r:id="rId11"/>
   </p:sldIdLst>
   <p:sldSz cx="9144000" cy="5143500" type="screen16x9"/>
   <p:notesSz cx="6858000" cy="9144000"/>
   <p:embeddedFontLst>
     <p:embeddedFont>
       <p:font typeface="Fira Sans Condensed" panose="020B0604020202020204" charset="0"/>
-      <p:regular r:id="rId13"/>
-      <p:bold r:id="rId14"/>
-      <p:italic r:id="rId15"/>
-      <p:boldItalic r:id="rId16"/>
+      <p:regular r:id="rId9"/>
+      <p:bold r:id="rId10"/>
+      <p:italic r:id="rId11"/>
+      <p:boldItalic r:id="rId12"/>
     </p:embeddedFont>
     <p:embeddedFont>
       <p:font typeface="Fira Sans Condensed ExtraBold" panose="020B0604020202020204" charset="0"/>
-      <p:bold r:id="rId17"/>
-      <p:boldItalic r:id="rId18"/>
+      <p:bold r:id="rId13"/>
+      <p:boldItalic r:id="rId14"/>
     </p:embeddedFont>
   </p:embeddedFontLst>
   <p:defaultTextStyle>
@@ -9423,15 +9419,7 @@
             </a:pPr>
             <a:r>
               <a:rPr lang="en" dirty="0"/>
-              <a:t>MIALab </a:t>
-            </a:r>
-            <a:r>
-              <a:rPr lang="en" dirty="0" smtClean="0"/>
-              <a:t>Project </a:t>
-            </a:r>
-            <a:r>
-              <a:rPr lang="en" dirty="0"/>
-              <a:t>– Group 2</a:t>
+              <a:t>MIALab Project – Group 2</a:t>
             </a:r>
             <a:endParaRPr dirty="0"/>
           </a:p>
@@ -17767,102 +17755,6 @@
   <p:clrMapOvr>
     <a:masterClrMapping/>
   </p:clrMapOvr>
-  <p:timing>
-    <p:tnLst>
-      <p:par>
-        <p:cTn id="1" dur="indefinite" restart="never" nodeType="tmRoot"/>
-      </p:par>
-    </p:tnLst>
-  </p:timing>
-</p:sld>
-</file>
-
-<file path=ppt/slides/slide10.xml><?xml version="1.0" encoding="utf-8"?>
-<p:sld xmlns:a="http://schemas.openxmlformats.org/drawingml/2006/main" xmlns:r="http://schemas.openxmlformats.org/officeDocument/2006/relationships" xmlns:p="http://schemas.openxmlformats.org/presentationml/2006/main">
-  <p:cSld>
-    <p:spTree>
-      <p:nvGrpSpPr>
-        <p:cNvPr id="1" name=""/>
-        <p:cNvGrpSpPr/>
-        <p:nvPr/>
-      </p:nvGrpSpPr>
-      <p:grpSpPr>
-        <a:xfrm>
-          <a:off x="0" y="0"/>
-          <a:ext cx="0" cy="0"/>
-          <a:chOff x="0" y="0"/>
-          <a:chExt cx="0" cy="0"/>
-        </a:xfrm>
-      </p:grpSpPr>
-      <p:sp>
-        <p:nvSpPr>
-          <p:cNvPr id="3" name="Titre 2"/>
-          <p:cNvSpPr>
-            <a:spLocks noGrp="1"/>
-          </p:cNvSpPr>
-          <p:nvPr>
-            <p:ph type="title"/>
-          </p:nvPr>
-        </p:nvSpPr>
-        <p:spPr/>
-        <p:txBody>
-          <a:bodyPr/>
-          <a:lstStyle/>
-          <a:p>
-            <a:r>
-              <a:rPr lang="fr-CH" dirty="0"/>
-              <a:t>Questions</a:t>
-            </a:r>
-          </a:p>
-        </p:txBody>
-      </p:sp>
-      <p:pic>
-        <p:nvPicPr>
-          <p:cNvPr id="4" name="Image 3"/>
-          <p:cNvPicPr>
-            <a:picLocks noChangeAspect="1"/>
-          </p:cNvPicPr>
-          <p:nvPr/>
-        </p:nvPicPr>
-        <p:blipFill>
-          <a:blip r:embed="rId2">
-            <a:extLst>
-              <a:ext uri="{28A0092B-C50C-407E-A947-70E740481C1C}">
-                <a14:useLocalDpi xmlns:a14="http://schemas.microsoft.com/office/drawing/2010/main" val="0"/>
-              </a:ext>
-            </a:extLst>
-          </a:blip>
-          <a:stretch>
-            <a:fillRect/>
-          </a:stretch>
-        </p:blipFill>
-        <p:spPr>
-          <a:xfrm>
-            <a:off x="3045350" y="1009150"/>
-            <a:ext cx="2912381" cy="2912381"/>
-          </a:xfrm>
-          <a:prstGeom prst="rect">
-            <a:avLst/>
-          </a:prstGeom>
-        </p:spPr>
-      </p:pic>
-    </p:spTree>
-    <p:extLst>
-      <p:ext uri="{BB962C8B-B14F-4D97-AF65-F5344CB8AC3E}">
-        <p14:creationId xmlns:p14="http://schemas.microsoft.com/office/powerpoint/2010/main" val="1320487190"/>
-      </p:ext>
-    </p:extLst>
-  </p:cSld>
-  <p:clrMapOvr>
-    <a:masterClrMapping/>
-  </p:clrMapOvr>
-  <p:timing>
-    <p:tnLst>
-      <p:par>
-        <p:cTn id="1" dur="indefinite" restart="never" nodeType="tmRoot"/>
-      </p:par>
-    </p:tnLst>
-  </p:timing>
 </p:sld>
 </file>
 
@@ -17885,7 +17777,13 @@
       </p:grpSpPr>
       <p:sp>
         <p:nvSpPr>
-          <p:cNvPr id="2" name="Espace réservé du texte 1"/>
+          <p:cNvPr id="2" name="Textplatzhalter 1">
+            <a:extLst>
+              <a:ext uri="{FF2B5EF4-FFF2-40B4-BE49-F238E27FC236}">
+                <a16:creationId xmlns:a16="http://schemas.microsoft.com/office/drawing/2014/main" id="{7D208967-52ED-4431-AA94-0F838C28EBA3}"/>
+              </a:ext>
+            </a:extLst>
+          </p:cNvPr>
           <p:cNvSpPr>
             <a:spLocks noGrp="1"/>
           </p:cNvSpPr>
@@ -17893,100 +17791,45 @@
             <p:ph type="body" idx="1"/>
           </p:nvPr>
         </p:nvSpPr>
-        <p:spPr/>
+        <p:spPr>
+          <a:xfrm>
+            <a:off x="672350" y="1152750"/>
+            <a:ext cx="6612114" cy="2838000"/>
+          </a:xfrm>
+        </p:spPr>
         <p:txBody>
           <a:bodyPr/>
           <a:lstStyle/>
           <a:p>
-            <a:pPr>
-              <a:spcAft>
-                <a:spcPts val="600"/>
-              </a:spcAft>
-            </a:pPr>
             <a:r>
               <a:rPr lang="en-US" dirty="0"/>
-              <a:t>Hypothesis</a:t>
+              <a:t>Principle is similar to majority voting</a:t>
             </a:r>
           </a:p>
           <a:p>
-            <a:pPr>
-              <a:spcAft>
-                <a:spcPts val="600"/>
-              </a:spcAft>
-            </a:pPr>
             <a:r>
               <a:rPr lang="en-US" dirty="0"/>
-              <a:t>Segmentation</a:t>
+              <a:t>Weighting by similarity Measurement with target</a:t>
             </a:r>
           </a:p>
           <a:p>
-            <a:pPr>
-              <a:spcAft>
-                <a:spcPts val="600"/>
-              </a:spcAft>
-            </a:pPr>
+            <a:pPr lvl="1"/>
             <a:r>
               <a:rPr lang="en-US" dirty="0"/>
-              <a:t>Registration</a:t>
+              <a:t>Mean square difference as similarity Measurement</a:t>
             </a:r>
-          </a:p>
-          <a:p>
-            <a:pPr>
-              <a:spcAft>
-                <a:spcPts val="600"/>
-              </a:spcAft>
-            </a:pPr>
-            <a:r>
-              <a:rPr lang="en-US" dirty="0"/>
-              <a:t>Preliminary results</a:t>
-            </a:r>
-          </a:p>
-          <a:p>
-            <a:pPr>
-              <a:spcAft>
-                <a:spcPts val="600"/>
-              </a:spcAft>
-            </a:pPr>
-            <a:r>
-              <a:rPr lang="en-US" dirty="0"/>
-              <a:t>Current state</a:t>
-            </a:r>
-          </a:p>
-          <a:p>
-            <a:pPr>
-              <a:spcAft>
-                <a:spcPts val="600"/>
-              </a:spcAft>
-            </a:pPr>
-            <a:r>
-              <a:rPr lang="en-US" dirty="0"/>
-              <a:t>Outlook</a:t>
-            </a:r>
-          </a:p>
-          <a:p>
-            <a:pPr>
-              <a:spcAft>
-                <a:spcPts val="600"/>
-              </a:spcAft>
-            </a:pPr>
-            <a:r>
-              <a:rPr lang="en-US" dirty="0"/>
-              <a:t>Questions</a:t>
-            </a:r>
-          </a:p>
-          <a:p>
-            <a:pPr>
-              <a:spcAft>
-                <a:spcPts val="600"/>
-              </a:spcAft>
-            </a:pPr>
-            <a:endParaRPr lang="fr-CH" dirty="0"/>
           </a:p>
         </p:txBody>
       </p:sp>
       <p:sp>
         <p:nvSpPr>
-          <p:cNvPr id="3" name="Titre 2"/>
+          <p:cNvPr id="3" name="Titel 2">
+            <a:extLst>
+              <a:ext uri="{FF2B5EF4-FFF2-40B4-BE49-F238E27FC236}">
+                <a16:creationId xmlns:a16="http://schemas.microsoft.com/office/drawing/2014/main" id="{268B1D7B-5693-43CF-9CF0-310C51C53716}"/>
+              </a:ext>
+            </a:extLst>
+          </p:cNvPr>
           <p:cNvSpPr>
             <a:spLocks noGrp="1"/>
           </p:cNvSpPr>
@@ -18001,28 +17844,84 @@
           <a:p>
             <a:r>
               <a:rPr lang="fr-CH" dirty="0"/>
-              <a:t>Table of content</a:t>
+              <a:t>Global </a:t>
             </a:r>
+            <a:r>
+              <a:rPr lang="fr-CH" dirty="0" err="1"/>
+              <a:t>Weighted</a:t>
+            </a:r>
+            <a:r>
+              <a:rPr lang="fr-CH" dirty="0"/>
+              <a:t> </a:t>
+            </a:r>
+            <a:r>
+              <a:rPr lang="fr-CH" dirty="0" err="1"/>
+              <a:t>Voting</a:t>
+            </a:r>
+            <a:br>
+              <a:rPr lang="fr-CH" dirty="0"/>
+            </a:br>
+            <a:endParaRPr lang="en-CH" dirty="0"/>
           </a:p>
         </p:txBody>
       </p:sp>
+      <p:pic>
+        <p:nvPicPr>
+          <p:cNvPr id="1028" name="Picture 4" descr="3: Typical atlas-based segmentation workflow where multiple atlases are...  | Download Scientific Diagram">
+            <a:extLst>
+              <a:ext uri="{FF2B5EF4-FFF2-40B4-BE49-F238E27FC236}">
+                <a16:creationId xmlns:a16="http://schemas.microsoft.com/office/drawing/2014/main" id="{3688B113-23D0-4ED6-814A-CEBD6F0395C1}"/>
+              </a:ext>
+            </a:extLst>
+          </p:cNvPr>
+          <p:cNvPicPr>
+            <a:picLocks noChangeAspect="1" noChangeArrowheads="1"/>
+          </p:cNvPicPr>
+          <p:nvPr/>
+        </p:nvPicPr>
+        <p:blipFill>
+          <a:blip r:embed="rId2">
+            <a:extLst>
+              <a:ext uri="{28A0092B-C50C-407E-A947-70E740481C1C}">
+                <a14:useLocalDpi xmlns:a14="http://schemas.microsoft.com/office/drawing/2010/main" val="0"/>
+              </a:ext>
+            </a:extLst>
+          </a:blip>
+          <a:srcRect/>
+          <a:stretch>
+            <a:fillRect/>
+          </a:stretch>
+        </p:blipFill>
+        <p:spPr bwMode="auto">
+          <a:xfrm>
+            <a:off x="1194035" y="2280405"/>
+            <a:ext cx="5644755" cy="2688324"/>
+          </a:xfrm>
+          <a:prstGeom prst="rect">
+            <a:avLst/>
+          </a:prstGeom>
+          <a:noFill/>
+          <a:extLst>
+            <a:ext uri="{909E8E84-426E-40DD-AFC4-6F175D3DCCD1}">
+              <a14:hiddenFill xmlns:a14="http://schemas.microsoft.com/office/drawing/2010/main">
+                <a:solidFill>
+                  <a:srgbClr val="FFFFFF"/>
+                </a:solidFill>
+              </a14:hiddenFill>
+            </a:ext>
+          </a:extLst>
+        </p:spPr>
+      </p:pic>
     </p:spTree>
     <p:extLst>
       <p:ext uri="{BB962C8B-B14F-4D97-AF65-F5344CB8AC3E}">
-        <p14:creationId xmlns:p14="http://schemas.microsoft.com/office/powerpoint/2010/main" val="3943295583"/>
+        <p14:creationId xmlns:p14="http://schemas.microsoft.com/office/powerpoint/2010/main" val="290175188"/>
       </p:ext>
     </p:extLst>
   </p:cSld>
   <p:clrMapOvr>
     <a:masterClrMapping/>
   </p:clrMapOvr>
-  <p:timing>
-    <p:tnLst>
-      <p:par>
-        <p:cTn id="1" dur="indefinite" restart="never" nodeType="tmRoot"/>
-      </p:par>
-    </p:tnLst>
-  </p:timing>
 </p:sld>
 </file>
 
@@ -18045,7 +17944,13 @@
       </p:grpSpPr>
       <p:sp>
         <p:nvSpPr>
-          <p:cNvPr id="2" name="Espace réservé du texte 1"/>
+          <p:cNvPr id="2" name="Textplatzhalter 1">
+            <a:extLst>
+              <a:ext uri="{FF2B5EF4-FFF2-40B4-BE49-F238E27FC236}">
+                <a16:creationId xmlns:a16="http://schemas.microsoft.com/office/drawing/2014/main" id="{7D208967-52ED-4431-AA94-0F838C28EBA3}"/>
+              </a:ext>
+            </a:extLst>
+          </p:cNvPr>
           <p:cNvSpPr>
             <a:spLocks noGrp="1"/>
           </p:cNvSpPr>
@@ -18053,51 +17958,45 @@
             <p:ph type="body" idx="1"/>
           </p:nvPr>
         </p:nvSpPr>
-        <p:spPr/>
+        <p:spPr>
+          <a:xfrm>
+            <a:off x="672350" y="1152750"/>
+            <a:ext cx="6612114" cy="2838000"/>
+          </a:xfrm>
+        </p:spPr>
         <p:txBody>
           <a:bodyPr/>
           <a:lstStyle/>
           <a:p>
-            <a:pPr>
-              <a:spcAft>
-                <a:spcPts val="600"/>
-              </a:spcAft>
-            </a:pPr>
             <a:r>
               <a:rPr lang="en-US" dirty="0"/>
-              <a:t>“Atlas based segmentation consists of a powerful baseline for brain tissue segmentation when compared to an ML based approach”</a:t>
+              <a:t>Principle is similar to global voting</a:t>
             </a:r>
           </a:p>
           <a:p>
-            <a:pPr>
-              <a:spcAft>
-                <a:spcPts val="600"/>
-              </a:spcAft>
-            </a:pPr>
             <a:r>
               <a:rPr lang="en-US" dirty="0"/>
-              <a:t>Main focus on segmentation types</a:t>
+              <a:t>Weighting by similarity Measurement with target</a:t>
             </a:r>
           </a:p>
           <a:p>
-            <a:pPr>
-              <a:spcAft>
-                <a:spcPts val="600"/>
-              </a:spcAft>
-            </a:pPr>
+            <a:pPr lvl="1"/>
             <a:r>
               <a:rPr lang="en-US" dirty="0"/>
-              <a:t>Segmentation depends on registration</a:t>
+              <a:t>Square difference as similarity Measurement</a:t>
             </a:r>
-          </a:p>
-          <a:p>
-            <a:endParaRPr lang="fr-CH" dirty="0"/>
           </a:p>
         </p:txBody>
       </p:sp>
       <p:sp>
         <p:nvSpPr>
-          <p:cNvPr id="3" name="Titre 2"/>
+          <p:cNvPr id="3" name="Titel 2">
+            <a:extLst>
+              <a:ext uri="{FF2B5EF4-FFF2-40B4-BE49-F238E27FC236}">
+                <a16:creationId xmlns:a16="http://schemas.microsoft.com/office/drawing/2014/main" id="{268B1D7B-5693-43CF-9CF0-310C51C53716}"/>
+              </a:ext>
+            </a:extLst>
+          </p:cNvPr>
           <p:cNvSpPr>
             <a:spLocks noGrp="1"/>
           </p:cNvSpPr>
@@ -18111,30 +18010,165 @@
           <a:lstStyle/>
           <a:p>
             <a:r>
+              <a:rPr lang="fr-CH" dirty="0"/>
+              <a:t>Local </a:t>
+            </a:r>
+            <a:r>
               <a:rPr lang="fr-CH" dirty="0" err="1"/>
-              <a:t>Hypothesis</a:t>
+              <a:t>Weighted</a:t>
             </a:r>
-            <a:endParaRPr lang="fr-CH" dirty="0"/>
+            <a:r>
+              <a:rPr lang="fr-CH" dirty="0"/>
+              <a:t> </a:t>
+            </a:r>
+            <a:r>
+              <a:rPr lang="fr-CH" dirty="0" err="1"/>
+              <a:t>Voting</a:t>
+            </a:r>
+            <a:br>
+              <a:rPr lang="fr-CH" dirty="0"/>
+            </a:br>
+            <a:endParaRPr lang="en-CH" dirty="0"/>
+          </a:p>
+        </p:txBody>
+      </p:sp>
+      <p:pic>
+        <p:nvPicPr>
+          <p:cNvPr id="1026" name="Picture 2">
+            <a:extLst>
+              <a:ext uri="{FF2B5EF4-FFF2-40B4-BE49-F238E27FC236}">
+                <a16:creationId xmlns:a16="http://schemas.microsoft.com/office/drawing/2014/main" id="{9655D407-6336-43F0-B0B6-BA225EDDC61E}"/>
+              </a:ext>
+            </a:extLst>
+          </p:cNvPr>
+          <p:cNvPicPr>
+            <a:picLocks noChangeAspect="1" noChangeArrowheads="1"/>
+          </p:cNvPicPr>
+          <p:nvPr/>
+        </p:nvPicPr>
+        <p:blipFill>
+          <a:blip r:embed="rId2">
+            <a:extLst>
+              <a:ext uri="{28A0092B-C50C-407E-A947-70E740481C1C}">
+                <a14:useLocalDpi xmlns:a14="http://schemas.microsoft.com/office/drawing/2010/main" val="0"/>
+              </a:ext>
+            </a:extLst>
+          </a:blip>
+          <a:srcRect/>
+          <a:stretch>
+            <a:fillRect/>
+          </a:stretch>
+        </p:blipFill>
+        <p:spPr bwMode="auto">
+          <a:xfrm>
+            <a:off x="672350" y="2301027"/>
+            <a:ext cx="8152760" cy="2639739"/>
+          </a:xfrm>
+          <a:prstGeom prst="rect">
+            <a:avLst/>
+          </a:prstGeom>
+          <a:noFill/>
+          <a:extLst>
+            <a:ext uri="{909E8E84-426E-40DD-AFC4-6F175D3DCCD1}">
+              <a14:hiddenFill xmlns:a14="http://schemas.microsoft.com/office/drawing/2010/main">
+                <a:solidFill>
+                  <a:srgbClr val="FFFFFF"/>
+                </a:solidFill>
+              </a14:hiddenFill>
+            </a:ext>
+          </a:extLst>
+        </p:spPr>
+      </p:pic>
+      <p:sp>
+        <p:nvSpPr>
+          <p:cNvPr id="4" name="Rechteck 3">
+            <a:extLst>
+              <a:ext uri="{FF2B5EF4-FFF2-40B4-BE49-F238E27FC236}">
+                <a16:creationId xmlns:a16="http://schemas.microsoft.com/office/drawing/2014/main" id="{3C5C8FAB-9947-4C4F-B225-C551F18DD658}"/>
+              </a:ext>
+            </a:extLst>
+          </p:cNvPr>
+          <p:cNvSpPr/>
+          <p:nvPr/>
+        </p:nvSpPr>
+        <p:spPr>
+          <a:xfrm>
+            <a:off x="7853081" y="2989089"/>
+            <a:ext cx="737667" cy="161365"/>
+          </a:xfrm>
+          <a:prstGeom prst="rect">
+            <a:avLst/>
+          </a:prstGeom>
+          <a:solidFill>
+            <a:srgbClr val="FBB810"/>
+          </a:solidFill>
+          <a:ln>
+            <a:noFill/>
+          </a:ln>
+        </p:spPr>
+        <p:style>
+          <a:lnRef idx="2">
+            <a:schemeClr val="accent1">
+              <a:shade val="50000"/>
+            </a:schemeClr>
+          </a:lnRef>
+          <a:fillRef idx="1">
+            <a:schemeClr val="accent1"/>
+          </a:fillRef>
+          <a:effectRef idx="0">
+            <a:schemeClr val="accent1"/>
+          </a:effectRef>
+          <a:fontRef idx="minor">
+            <a:schemeClr val="lt1"/>
+          </a:fontRef>
+        </p:style>
+        <p:txBody>
+          <a:bodyPr rtlCol="0" anchor="ctr"/>
+          <a:lstStyle/>
+          <a:p>
+            <a:pPr algn="ctr"/>
+            <a:r>
+              <a:rPr lang="de-CH" sz="1100" dirty="0">
+                <a:ln w="0"/>
+                <a:solidFill>
+                  <a:schemeClr val="tx1"/>
+                </a:solidFill>
+                <a:effectLst>
+                  <a:outerShdw blurRad="38100" dist="19050" dir="2700000" algn="tl" rotWithShape="0">
+                    <a:schemeClr val="dk1">
+                      <a:alpha val="40000"/>
+                    </a:schemeClr>
+                  </a:outerShdw>
+                </a:effectLst>
+              </a:rPr>
+              <a:t>LWV</a:t>
+            </a:r>
+            <a:endParaRPr lang="en-CH" sz="1100" dirty="0">
+              <a:ln w="0"/>
+              <a:solidFill>
+                <a:schemeClr val="tx1"/>
+              </a:solidFill>
+              <a:effectLst>
+                <a:outerShdw blurRad="38100" dist="19050" dir="2700000" algn="tl" rotWithShape="0">
+                  <a:schemeClr val="dk1">
+                    <a:alpha val="40000"/>
+                  </a:schemeClr>
+                </a:outerShdw>
+              </a:effectLst>
+            </a:endParaRPr>
           </a:p>
         </p:txBody>
       </p:sp>
     </p:spTree>
     <p:extLst>
       <p:ext uri="{BB962C8B-B14F-4D97-AF65-F5344CB8AC3E}">
-        <p14:creationId xmlns:p14="http://schemas.microsoft.com/office/powerpoint/2010/main" val="1893813647"/>
+        <p14:creationId xmlns:p14="http://schemas.microsoft.com/office/powerpoint/2010/main" val="724096695"/>
       </p:ext>
     </p:extLst>
   </p:cSld>
   <p:clrMapOvr>
     <a:masterClrMapping/>
   </p:clrMapOvr>
-  <p:timing>
-    <p:tnLst>
-      <p:par>
-        <p:cTn id="1" dur="indefinite" restart="never" nodeType="tmRoot"/>
-      </p:par>
-    </p:tnLst>
-  </p:timing>
 </p:sld>
 </file>
 
@@ -18157,7 +18191,13 @@
       </p:grpSpPr>
       <p:sp>
         <p:nvSpPr>
-          <p:cNvPr id="2" name="Espace réservé du texte 1"/>
+          <p:cNvPr id="2" name="Textplatzhalter 1">
+            <a:extLst>
+              <a:ext uri="{FF2B5EF4-FFF2-40B4-BE49-F238E27FC236}">
+                <a16:creationId xmlns:a16="http://schemas.microsoft.com/office/drawing/2014/main" id="{7D208967-52ED-4431-AA94-0F838C28EBA3}"/>
+              </a:ext>
+            </a:extLst>
+          </p:cNvPr>
           <p:cNvSpPr>
             <a:spLocks noGrp="1"/>
           </p:cNvSpPr>
@@ -18165,122 +18205,42 @@
             <p:ph type="body" idx="1"/>
           </p:nvPr>
         </p:nvSpPr>
-        <p:spPr/>
+        <p:spPr>
+          <a:xfrm>
+            <a:off x="672350" y="1152750"/>
+            <a:ext cx="6612114" cy="2838000"/>
+          </a:xfrm>
+        </p:spPr>
         <p:txBody>
           <a:bodyPr/>
           <a:lstStyle/>
           <a:p>
-            <a:pPr>
-              <a:spcAft>
-                <a:spcPts val="600"/>
-              </a:spcAft>
-            </a:pPr>
             <a:r>
-              <a:rPr lang="en-GB" dirty="0" smtClean="0"/>
-              <a:t>Machine learning</a:t>
+              <a:rPr lang="en-US" dirty="0"/>
+              <a:t>Machine learning based on random forest decision tree</a:t>
             </a:r>
           </a:p>
           <a:p>
-            <a:pPr lvl="1">
-              <a:spcBef>
-                <a:spcPts val="0"/>
-              </a:spcBef>
-              <a:spcAft>
-                <a:spcPts val="600"/>
-              </a:spcAft>
-            </a:pPr>
             <a:r>
-              <a:rPr lang="en-GB" dirty="0" smtClean="0"/>
-              <a:t>Decision forest </a:t>
+              <a:rPr lang="en-US" dirty="0"/>
+              <a:t>Optimization of Parameters depth and estimator</a:t>
             </a:r>
           </a:p>
           <a:p>
-            <a:pPr>
-              <a:spcAft>
-                <a:spcPts val="600"/>
-              </a:spcAft>
-            </a:pPr>
-            <a:r>
-              <a:rPr lang="en-GB" dirty="0" smtClean="0"/>
-              <a:t>Atlas-based</a:t>
-            </a:r>
-          </a:p>
-          <a:p>
-            <a:pPr lvl="1">
-              <a:spcBef>
-                <a:spcPts val="0"/>
-              </a:spcBef>
-              <a:spcAft>
-                <a:spcPts val="600"/>
-              </a:spcAft>
-            </a:pPr>
-            <a:r>
-              <a:rPr lang="en-GB" dirty="0" smtClean="0"/>
-              <a:t>Single atlas</a:t>
-            </a:r>
-          </a:p>
-          <a:p>
-            <a:pPr lvl="1">
-              <a:spcBef>
-                <a:spcPts val="0"/>
-              </a:spcBef>
-              <a:spcAft>
-                <a:spcPts val="600"/>
-              </a:spcAft>
-            </a:pPr>
-            <a:r>
-              <a:rPr lang="en-GB" dirty="0" smtClean="0"/>
-              <a:t>Multi-atlas</a:t>
-            </a:r>
-          </a:p>
-          <a:p>
-            <a:pPr lvl="2">
-              <a:spcBef>
-                <a:spcPts val="0"/>
-              </a:spcBef>
-              <a:spcAft>
-                <a:spcPts val="600"/>
-              </a:spcAft>
-            </a:pPr>
-            <a:r>
-              <a:rPr lang="en-GB" dirty="0" smtClean="0"/>
-              <a:t>Majority voting</a:t>
-            </a:r>
-          </a:p>
-          <a:p>
-            <a:pPr lvl="2">
-              <a:spcBef>
-                <a:spcPts val="0"/>
-              </a:spcBef>
-              <a:spcAft>
-                <a:spcPts val="600"/>
-              </a:spcAft>
-            </a:pPr>
-            <a:r>
-              <a:rPr lang="en-GB" dirty="0" smtClean="0"/>
-              <a:t>Global/local weighted voting</a:t>
-            </a:r>
-          </a:p>
-          <a:p>
-            <a:pPr lvl="2">
-              <a:spcBef>
-                <a:spcPts val="0"/>
-              </a:spcBef>
-              <a:spcAft>
-                <a:spcPts val="600"/>
-              </a:spcAft>
-            </a:pPr>
-            <a:r>
-              <a:rPr lang="en-GB" dirty="0" smtClean="0"/>
-              <a:t>Shape-based averaging</a:t>
-            </a:r>
-            <a:endParaRPr lang="en-GB" dirty="0"/>
+            <a:pPr lvl="1"/>
+            <a:endParaRPr lang="en-US" dirty="0"/>
           </a:p>
         </p:txBody>
       </p:sp>
       <p:sp>
         <p:nvSpPr>
-          <p:cNvPr id="3" name="Titre 2"/>
+          <p:cNvPr id="3" name="Titel 2">
+            <a:extLst>
+              <a:ext uri="{FF2B5EF4-FFF2-40B4-BE49-F238E27FC236}">
+                <a16:creationId xmlns:a16="http://schemas.microsoft.com/office/drawing/2014/main" id="{268B1D7B-5693-43CF-9CF0-310C51C53716}"/>
+              </a:ext>
+            </a:extLst>
+          </p:cNvPr>
           <p:cNvSpPr>
             <a:spLocks noGrp="1"/>
           </p:cNvSpPr>
@@ -18288,44 +18248,87 @@
             <p:ph type="title"/>
           </p:nvPr>
         </p:nvSpPr>
-        <p:spPr>
-          <a:xfrm>
-            <a:off x="672349" y="436450"/>
-            <a:ext cx="5012013" cy="572700"/>
-          </a:xfrm>
-        </p:spPr>
+        <p:spPr/>
         <p:txBody>
           <a:bodyPr/>
           <a:lstStyle/>
           <a:p>
             <a:r>
               <a:rPr lang="fr-CH" dirty="0"/>
-              <a:t>Segmentation</a:t>
+              <a:t>Machine Learning</a:t>
             </a:r>
-            <a:br>
-              <a:rPr lang="fr-CH" dirty="0"/>
-            </a:br>
-            <a:endParaRPr lang="fr-CH" dirty="0"/>
+            <a:endParaRPr lang="en-CH" dirty="0"/>
           </a:p>
         </p:txBody>
       </p:sp>
+      <p:pic>
+        <p:nvPicPr>
+          <p:cNvPr id="6" name="Grafik 5">
+            <a:extLst>
+              <a:ext uri="{FF2B5EF4-FFF2-40B4-BE49-F238E27FC236}">
+                <a16:creationId xmlns:a16="http://schemas.microsoft.com/office/drawing/2014/main" id="{A3EF1C89-ACD5-4C10-8053-AFC8FE2178C4}"/>
+              </a:ext>
+            </a:extLst>
+          </p:cNvPr>
+          <p:cNvPicPr>
+            <a:picLocks noChangeAspect="1"/>
+          </p:cNvPicPr>
+          <p:nvPr/>
+        </p:nvPicPr>
+        <p:blipFill rotWithShape="1">
+          <a:blip r:embed="rId2"/>
+          <a:srcRect r="6612"/>
+          <a:stretch/>
+        </p:blipFill>
+        <p:spPr>
+          <a:xfrm>
+            <a:off x="0" y="2037380"/>
+            <a:ext cx="4641156" cy="3106120"/>
+          </a:xfrm>
+          <a:prstGeom prst="rect">
+            <a:avLst/>
+          </a:prstGeom>
+        </p:spPr>
+      </p:pic>
+      <p:pic>
+        <p:nvPicPr>
+          <p:cNvPr id="8" name="Grafik 7">
+            <a:extLst>
+              <a:ext uri="{FF2B5EF4-FFF2-40B4-BE49-F238E27FC236}">
+                <a16:creationId xmlns:a16="http://schemas.microsoft.com/office/drawing/2014/main" id="{6DD90375-C3DE-40F6-B2B6-043473C7C240}"/>
+              </a:ext>
+            </a:extLst>
+          </p:cNvPr>
+          <p:cNvPicPr>
+            <a:picLocks noChangeAspect="1"/>
+          </p:cNvPicPr>
+          <p:nvPr/>
+        </p:nvPicPr>
+        <p:blipFill rotWithShape="1">
+          <a:blip r:embed="rId3"/>
+          <a:srcRect l="7423"/>
+          <a:stretch/>
+        </p:blipFill>
+        <p:spPr>
+          <a:xfrm>
+            <a:off x="4572000" y="2037380"/>
+            <a:ext cx="4572000" cy="3086609"/>
+          </a:xfrm>
+          <a:prstGeom prst="rect">
+            <a:avLst/>
+          </a:prstGeom>
+        </p:spPr>
+      </p:pic>
     </p:spTree>
     <p:extLst>
       <p:ext uri="{BB962C8B-B14F-4D97-AF65-F5344CB8AC3E}">
-        <p14:creationId xmlns:p14="http://schemas.microsoft.com/office/powerpoint/2010/main" val="431237675"/>
+        <p14:creationId xmlns:p14="http://schemas.microsoft.com/office/powerpoint/2010/main" val="178755980"/>
       </p:ext>
     </p:extLst>
   </p:cSld>
   <p:clrMapOvr>
     <a:masterClrMapping/>
   </p:clrMapOvr>
-  <p:timing>
-    <p:tnLst>
-      <p:par>
-        <p:cTn id="1" dur="indefinite" restart="never" nodeType="tmRoot"/>
-      </p:par>
-    </p:tnLst>
-  </p:timing>
 </p:sld>
 </file>
 
@@ -18372,7 +18375,7 @@
               </a:spcAft>
             </a:pPr>
             <a:r>
-              <a:rPr lang="en-GB" dirty="0" smtClean="0"/>
+              <a:rPr lang="en-GB" dirty="0"/>
               <a:t>Affine</a:t>
             </a:r>
           </a:p>
@@ -18386,7 +18389,7 @@
               </a:spcAft>
             </a:pPr>
             <a:r>
-              <a:rPr lang="en-GB" dirty="0" smtClean="0"/>
+              <a:rPr lang="en-GB" dirty="0"/>
               <a:t>Rotation, Translation and Scaling</a:t>
             </a:r>
           </a:p>
@@ -18400,7 +18403,7 @@
               </a:spcAft>
             </a:pPr>
             <a:r>
-              <a:rPr lang="en-GB" dirty="0" smtClean="0"/>
+              <a:rPr lang="en-GB" dirty="0"/>
               <a:t>Already existed</a:t>
             </a:r>
           </a:p>
@@ -18411,7 +18414,7 @@
               </a:spcAft>
             </a:pPr>
             <a:r>
-              <a:rPr lang="en-GB" dirty="0" smtClean="0"/>
+              <a:rPr lang="en-GB" dirty="0"/>
               <a:t>Non-rigid</a:t>
             </a:r>
           </a:p>
@@ -18425,7 +18428,7 @@
               </a:spcAft>
             </a:pPr>
             <a:r>
-              <a:rPr lang="en-GB" dirty="0" smtClean="0"/>
+              <a:rPr lang="en-GB" dirty="0"/>
               <a:t>Compensate free form deformation</a:t>
             </a:r>
           </a:p>
@@ -18439,7 +18442,7 @@
               </a:spcAft>
             </a:pPr>
             <a:r>
-              <a:rPr lang="en-GB" dirty="0" smtClean="0"/>
+              <a:rPr lang="en-GB" dirty="0"/>
               <a:t>B-Spline Registration</a:t>
             </a:r>
           </a:p>
@@ -18453,11 +18456,11 @@
               </a:spcAft>
             </a:pPr>
             <a:r>
-              <a:rPr lang="en-GB" u="sng" dirty="0" err="1" smtClean="0"/>
+              <a:rPr lang="en-GB" dirty="0" err="1"/>
               <a:t>SimpleElastix</a:t>
             </a:r>
             <a:r>
-              <a:rPr lang="en-GB" u="sng" dirty="0" smtClean="0"/>
+              <a:rPr lang="en-GB" dirty="0"/>
               <a:t> Library</a:t>
             </a:r>
           </a:p>
@@ -18512,13 +18515,6 @@
   <p:clrMapOvr>
     <a:masterClrMapping/>
   </p:clrMapOvr>
-  <p:timing>
-    <p:tnLst>
-      <p:par>
-        <p:cTn id="1" dur="indefinite" restart="never" nodeType="tmRoot"/>
-      </p:par>
-    </p:tnLst>
-  </p:timing>
 </p:sld>
 </file>
 
@@ -18575,7 +18571,7 @@
           <p:cNvPr id="12" name="Textfeld 11">
             <a:extLst>
               <a:ext uri="{FF2B5EF4-FFF2-40B4-BE49-F238E27FC236}">
-                <a16:creationId xmlns:a16="http://schemas.microsoft.com/office/drawing/2014/main" xmlns="" id="{6FBAE4E7-3A3E-415A-8FC6-165BDB05ADF1}"/>
+                <a16:creationId xmlns:a16="http://schemas.microsoft.com/office/drawing/2014/main" id="{6FBAE4E7-3A3E-415A-8FC6-165BDB05ADF1}"/>
               </a:ext>
             </a:extLst>
           </p:cNvPr>
@@ -18646,7 +18642,7 @@
           <p:cNvPr id="14" name="Textfeld 13">
             <a:extLst>
               <a:ext uri="{FF2B5EF4-FFF2-40B4-BE49-F238E27FC236}">
-                <a16:creationId xmlns:a16="http://schemas.microsoft.com/office/drawing/2014/main" xmlns="" id="{672DD57D-91A9-4F21-9981-CDDB90B625C7}"/>
+                <a16:creationId xmlns:a16="http://schemas.microsoft.com/office/drawing/2014/main" id="{672DD57D-91A9-4F21-9981-CDDB90B625C7}"/>
               </a:ext>
             </a:extLst>
           </p:cNvPr>
@@ -18691,10 +18687,10 @@
       </p:sp>
       <p:pic>
         <p:nvPicPr>
-          <p:cNvPr id="4" name="Grafik 3">
+          <p:cNvPr id="5" name="Grafik 4">
             <a:extLst>
               <a:ext uri="{FF2B5EF4-FFF2-40B4-BE49-F238E27FC236}">
-                <a16:creationId xmlns:a16="http://schemas.microsoft.com/office/drawing/2014/main" xmlns="" id="{7E3AF0D3-7CCB-49C7-8201-E4D490CA2181}"/>
+                <a16:creationId xmlns:a16="http://schemas.microsoft.com/office/drawing/2014/main" id="{9BE9A13A-8E11-49A3-8728-4E5530319959}"/>
               </a:ext>
             </a:extLst>
           </p:cNvPr>
@@ -18705,13 +18701,13 @@
         </p:nvPicPr>
         <p:blipFill rotWithShape="1">
           <a:blip r:embed="rId2"/>
-          <a:srcRect l="27259" t="12941" r="24160" b="11014"/>
+          <a:srcRect l="14680" t="5293" r="11277" b="8565"/>
           <a:stretch/>
         </p:blipFill>
         <p:spPr>
           <a:xfrm>
-            <a:off x="5409557" y="1487827"/>
-            <a:ext cx="2843095" cy="3337752"/>
+            <a:off x="672349" y="1526202"/>
+            <a:ext cx="3434763" cy="3323363"/>
           </a:xfrm>
           <a:prstGeom prst="rect">
             <a:avLst/>
@@ -18720,10 +18716,10 @@
       </p:pic>
       <p:pic>
         <p:nvPicPr>
-          <p:cNvPr id="6" name="Grafik 5">
+          <p:cNvPr id="8" name="Grafik 7">
             <a:extLst>
               <a:ext uri="{FF2B5EF4-FFF2-40B4-BE49-F238E27FC236}">
-                <a16:creationId xmlns:a16="http://schemas.microsoft.com/office/drawing/2014/main" xmlns="" id="{ADE48117-B4F3-4EC6-BD89-D1CD35CC7B8F}"/>
+                <a16:creationId xmlns:a16="http://schemas.microsoft.com/office/drawing/2014/main" id="{3681BC8F-4DDF-412B-BC7A-DF43AB38E0D3}"/>
               </a:ext>
             </a:extLst>
           </p:cNvPr>
@@ -18734,13 +18730,13 @@
         </p:nvPicPr>
         <p:blipFill rotWithShape="1">
           <a:blip r:embed="rId3"/>
-          <a:srcRect l="27042" t="12259" r="24376" b="11695"/>
+          <a:srcRect l="13305" t="5761" r="8647" b="8015"/>
           <a:stretch/>
         </p:blipFill>
         <p:spPr>
           <a:xfrm>
-            <a:off x="672348" y="1487827"/>
-            <a:ext cx="2843094" cy="3337752"/>
+            <a:off x="4572000" y="1571090"/>
+            <a:ext cx="3715233" cy="3413470"/>
           </a:xfrm>
           <a:prstGeom prst="rect">
             <a:avLst/>
@@ -18757,467 +18753,6 @@
   <p:clrMapOvr>
     <a:masterClrMapping/>
   </p:clrMapOvr>
-  <p:timing>
-    <p:tnLst>
-      <p:par>
-        <p:cTn id="1" dur="indefinite" restart="never" nodeType="tmRoot"/>
-      </p:par>
-    </p:tnLst>
-  </p:timing>
-</p:sld>
-</file>
-
-<file path=ppt/slides/slide7.xml><?xml version="1.0" encoding="utf-8"?>
-<p:sld xmlns:a="http://schemas.openxmlformats.org/drawingml/2006/main" xmlns:r="http://schemas.openxmlformats.org/officeDocument/2006/relationships" xmlns:p="http://schemas.openxmlformats.org/presentationml/2006/main">
-  <p:cSld>
-    <p:spTree>
-      <p:nvGrpSpPr>
-        <p:cNvPr id="1" name=""/>
-        <p:cNvGrpSpPr/>
-        <p:nvPr/>
-      </p:nvGrpSpPr>
-      <p:grpSpPr>
-        <a:xfrm>
-          <a:off x="0" y="0"/>
-          <a:ext cx="0" cy="0"/>
-          <a:chOff x="0" y="0"/>
-          <a:chExt cx="0" cy="0"/>
-        </a:xfrm>
-      </p:grpSpPr>
-      <p:sp>
-        <p:nvSpPr>
-          <p:cNvPr id="2" name="Espace réservé du texte 1"/>
-          <p:cNvSpPr>
-            <a:spLocks noGrp="1"/>
-          </p:cNvSpPr>
-          <p:nvPr>
-            <p:ph type="body" idx="1"/>
-          </p:nvPr>
-        </p:nvSpPr>
-        <p:spPr/>
-        <p:txBody>
-          <a:bodyPr/>
-          <a:lstStyle/>
-          <a:p>
-            <a:endParaRPr lang="fr-CH" dirty="0"/>
-          </a:p>
-        </p:txBody>
-      </p:sp>
-      <p:pic>
-        <p:nvPicPr>
-          <p:cNvPr id="4" name="Image 3"/>
-          <p:cNvPicPr>
-            <a:picLocks noChangeAspect="1"/>
-          </p:cNvPicPr>
-          <p:nvPr/>
-        </p:nvPicPr>
-        <p:blipFill rotWithShape="1">
-          <a:blip r:embed="rId2">
-            <a:extLst>
-              <a:ext uri="{28A0092B-C50C-407E-A947-70E740481C1C}">
-                <a14:useLocalDpi xmlns:a14="http://schemas.microsoft.com/office/drawing/2010/main" val="0"/>
-              </a:ext>
-            </a:extLst>
-          </a:blip>
-          <a:srcRect l="7545" t="8628" r="8766" b="3934"/>
-          <a:stretch/>
-        </p:blipFill>
-        <p:spPr>
-          <a:xfrm>
-            <a:off x="672349" y="1014977"/>
-            <a:ext cx="6322339" cy="4128524"/>
-          </a:xfrm>
-          <a:prstGeom prst="rect">
-            <a:avLst/>
-          </a:prstGeom>
-          <a:effectLst>
-            <a:softEdge rad="31750"/>
-          </a:effectLst>
-        </p:spPr>
-      </p:pic>
-      <p:sp>
-        <p:nvSpPr>
-          <p:cNvPr id="3" name="Titre 2"/>
-          <p:cNvSpPr>
-            <a:spLocks noGrp="1"/>
-          </p:cNvSpPr>
-          <p:nvPr>
-            <p:ph type="title"/>
-          </p:nvPr>
-        </p:nvSpPr>
-        <p:spPr/>
-        <p:txBody>
-          <a:bodyPr/>
-          <a:lstStyle/>
-          <a:p>
-            <a:r>
-              <a:rPr lang="fr-CH" dirty="0" err="1"/>
-              <a:t>Preliminary</a:t>
-            </a:r>
-            <a:r>
-              <a:rPr lang="fr-CH" dirty="0"/>
-              <a:t> </a:t>
-            </a:r>
-            <a:r>
-              <a:rPr lang="fr-CH" dirty="0" err="1"/>
-              <a:t>results</a:t>
-            </a:r>
-            <a:endParaRPr lang="fr-CH" dirty="0"/>
-          </a:p>
-        </p:txBody>
-      </p:sp>
-    </p:spTree>
-    <p:extLst>
-      <p:ext uri="{BB962C8B-B14F-4D97-AF65-F5344CB8AC3E}">
-        <p14:creationId xmlns:p14="http://schemas.microsoft.com/office/powerpoint/2010/main" val="10031678"/>
-      </p:ext>
-    </p:extLst>
-  </p:cSld>
-  <p:clrMapOvr>
-    <a:masterClrMapping/>
-  </p:clrMapOvr>
-  <p:timing>
-    <p:tnLst>
-      <p:par>
-        <p:cTn id="1" dur="indefinite" restart="never" nodeType="tmRoot"/>
-      </p:par>
-    </p:tnLst>
-  </p:timing>
-</p:sld>
-</file>
-
-<file path=ppt/slides/slide8.xml><?xml version="1.0" encoding="utf-8"?>
-<p:sld xmlns:a="http://schemas.openxmlformats.org/drawingml/2006/main" xmlns:r="http://schemas.openxmlformats.org/officeDocument/2006/relationships" xmlns:p="http://schemas.openxmlformats.org/presentationml/2006/main">
-  <p:cSld>
-    <p:spTree>
-      <p:nvGrpSpPr>
-        <p:cNvPr id="1" name=""/>
-        <p:cNvGrpSpPr/>
-        <p:nvPr/>
-      </p:nvGrpSpPr>
-      <p:grpSpPr>
-        <a:xfrm>
-          <a:off x="0" y="0"/>
-          <a:ext cx="0" cy="0"/>
-          <a:chOff x="0" y="0"/>
-          <a:chExt cx="0" cy="0"/>
-        </a:xfrm>
-      </p:grpSpPr>
-      <p:sp>
-        <p:nvSpPr>
-          <p:cNvPr id="2" name="Espace réservé du texte 1"/>
-          <p:cNvSpPr>
-            <a:spLocks noGrp="1"/>
-          </p:cNvSpPr>
-          <p:nvPr>
-            <p:ph type="body" idx="1"/>
-          </p:nvPr>
-        </p:nvSpPr>
-        <p:spPr/>
-        <p:txBody>
-          <a:bodyPr/>
-          <a:lstStyle/>
-          <a:p>
-            <a:pPr>
-              <a:spcAft>
-                <a:spcPts val="600"/>
-              </a:spcAft>
-            </a:pPr>
-            <a:r>
-              <a:rPr lang="en-US" dirty="0"/>
-              <a:t>Implementation of non-rigid registration</a:t>
-            </a:r>
-          </a:p>
-          <a:p>
-            <a:pPr>
-              <a:spcAft>
-                <a:spcPts val="600"/>
-              </a:spcAft>
-            </a:pPr>
-            <a:r>
-              <a:rPr lang="en-US" dirty="0"/>
-              <a:t>Implementation of majority voting atlas-based segmentation</a:t>
-            </a:r>
-          </a:p>
-          <a:p>
-            <a:pPr>
-              <a:spcAft>
-                <a:spcPts val="600"/>
-              </a:spcAft>
-            </a:pPr>
-            <a:r>
-              <a:rPr lang="en-US" dirty="0"/>
-              <a:t>Comparison of the four different solution</a:t>
-            </a:r>
-          </a:p>
-          <a:p>
-            <a:pPr lvl="1">
-              <a:spcBef>
-                <a:spcPts val="0"/>
-              </a:spcBef>
-              <a:spcAft>
-                <a:spcPts val="600"/>
-              </a:spcAft>
-            </a:pPr>
-            <a:r>
-              <a:rPr lang="en-US" dirty="0"/>
-              <a:t>ML-based segmentation with affine registration</a:t>
-            </a:r>
-          </a:p>
-          <a:p>
-            <a:pPr lvl="1">
-              <a:spcBef>
-                <a:spcPts val="0"/>
-              </a:spcBef>
-              <a:spcAft>
-                <a:spcPts val="600"/>
-              </a:spcAft>
-            </a:pPr>
-            <a:r>
-              <a:rPr lang="en-US" dirty="0"/>
-              <a:t>ML-based segmentation with non-rigid registration</a:t>
-            </a:r>
-          </a:p>
-          <a:p>
-            <a:pPr lvl="1">
-              <a:spcBef>
-                <a:spcPts val="0"/>
-              </a:spcBef>
-              <a:spcAft>
-                <a:spcPts val="600"/>
-              </a:spcAft>
-            </a:pPr>
-            <a:r>
-              <a:rPr lang="en-US" dirty="0"/>
-              <a:t>Atlas-based segmentation with affine registration</a:t>
-            </a:r>
-          </a:p>
-          <a:p>
-            <a:pPr lvl="1">
-              <a:spcBef>
-                <a:spcPts val="0"/>
-              </a:spcBef>
-              <a:spcAft>
-                <a:spcPts val="600"/>
-              </a:spcAft>
-            </a:pPr>
-            <a:r>
-              <a:rPr lang="en-US" dirty="0"/>
-              <a:t>Atlas-based segmentation with non-rigid registration</a:t>
-            </a:r>
-          </a:p>
-          <a:p>
-            <a:pPr>
-              <a:spcAft>
-                <a:spcPts val="600"/>
-              </a:spcAft>
-            </a:pPr>
-            <a:endParaRPr lang="fr-CH" dirty="0"/>
-          </a:p>
-        </p:txBody>
-      </p:sp>
-      <p:sp>
-        <p:nvSpPr>
-          <p:cNvPr id="3" name="Titre 2"/>
-          <p:cNvSpPr>
-            <a:spLocks noGrp="1"/>
-          </p:cNvSpPr>
-          <p:nvPr>
-            <p:ph type="title"/>
-          </p:nvPr>
-        </p:nvSpPr>
-        <p:spPr/>
-        <p:txBody>
-          <a:bodyPr/>
-          <a:lstStyle/>
-          <a:p>
-            <a:r>
-              <a:rPr lang="fr-CH" dirty="0" err="1"/>
-              <a:t>Current</a:t>
-            </a:r>
-            <a:r>
-              <a:rPr lang="fr-CH" dirty="0"/>
-              <a:t> state</a:t>
-            </a:r>
-          </a:p>
-        </p:txBody>
-      </p:sp>
-    </p:spTree>
-    <p:extLst>
-      <p:ext uri="{BB962C8B-B14F-4D97-AF65-F5344CB8AC3E}">
-        <p14:creationId xmlns:p14="http://schemas.microsoft.com/office/powerpoint/2010/main" val="2982305108"/>
-      </p:ext>
-    </p:extLst>
-  </p:cSld>
-  <p:clrMapOvr>
-    <a:masterClrMapping/>
-  </p:clrMapOvr>
-  <p:timing>
-    <p:tnLst>
-      <p:par>
-        <p:cTn id="1" dur="indefinite" restart="never" nodeType="tmRoot"/>
-      </p:par>
-    </p:tnLst>
-  </p:timing>
-</p:sld>
-</file>
-
-<file path=ppt/slides/slide9.xml><?xml version="1.0" encoding="utf-8"?>
-<p:sld xmlns:a="http://schemas.openxmlformats.org/drawingml/2006/main" xmlns:r="http://schemas.openxmlformats.org/officeDocument/2006/relationships" xmlns:p="http://schemas.openxmlformats.org/presentationml/2006/main">
-  <p:cSld>
-    <p:spTree>
-      <p:nvGrpSpPr>
-        <p:cNvPr id="1" name=""/>
-        <p:cNvGrpSpPr/>
-        <p:nvPr/>
-      </p:nvGrpSpPr>
-      <p:grpSpPr>
-        <a:xfrm>
-          <a:off x="0" y="0"/>
-          <a:ext cx="0" cy="0"/>
-          <a:chOff x="0" y="0"/>
-          <a:chExt cx="0" cy="0"/>
-        </a:xfrm>
-      </p:grpSpPr>
-      <p:sp>
-        <p:nvSpPr>
-          <p:cNvPr id="2" name="Espace réservé du texte 1"/>
-          <p:cNvSpPr>
-            <a:spLocks noGrp="1"/>
-          </p:cNvSpPr>
-          <p:nvPr>
-            <p:ph type="body" idx="1"/>
-          </p:nvPr>
-        </p:nvSpPr>
-        <p:spPr/>
-        <p:txBody>
-          <a:bodyPr/>
-          <a:lstStyle/>
-          <a:p>
-            <a:pPr>
-              <a:spcAft>
-                <a:spcPts val="600"/>
-              </a:spcAft>
-            </a:pPr>
-            <a:r>
-              <a:rPr lang="en-GB" dirty="0"/>
-              <a:t>More </a:t>
-            </a:r>
-            <a:r>
-              <a:rPr lang="en-GB" dirty="0" err="1"/>
-              <a:t>altas</a:t>
-            </a:r>
-            <a:r>
-              <a:rPr lang="en-GB" dirty="0"/>
-              <a:t> building techniques</a:t>
-            </a:r>
-          </a:p>
-          <a:p>
-            <a:pPr>
-              <a:spcAft>
-                <a:spcPts val="600"/>
-              </a:spcAft>
-            </a:pPr>
-            <a:r>
-              <a:rPr lang="en-GB" dirty="0"/>
-              <a:t>More ML segmentation types</a:t>
-            </a:r>
-          </a:p>
-          <a:p>
-            <a:pPr>
-              <a:spcAft>
-                <a:spcPts val="600"/>
-              </a:spcAft>
-            </a:pPr>
-            <a:r>
-              <a:rPr lang="en-GB" dirty="0" err="1"/>
-              <a:t>Uniformize</a:t>
-            </a:r>
-            <a:r>
-              <a:rPr lang="en-GB" dirty="0"/>
-              <a:t> result plot</a:t>
-            </a:r>
-          </a:p>
-          <a:p>
-            <a:pPr>
-              <a:spcAft>
-                <a:spcPts val="600"/>
-              </a:spcAft>
-            </a:pPr>
-            <a:r>
-              <a:rPr lang="en-GB" dirty="0"/>
-              <a:t>Eventually hybrid solution</a:t>
-            </a:r>
-          </a:p>
-          <a:p>
-            <a:pPr lvl="1">
-              <a:spcBef>
-                <a:spcPts val="0"/>
-              </a:spcBef>
-              <a:spcAft>
-                <a:spcPts val="600"/>
-              </a:spcAft>
-            </a:pPr>
-            <a:r>
-              <a:rPr lang="en-GB" dirty="0"/>
-              <a:t>ML for grey and white matter</a:t>
-            </a:r>
-          </a:p>
-          <a:p>
-            <a:pPr lvl="1">
-              <a:spcBef>
-                <a:spcPts val="0"/>
-              </a:spcBef>
-              <a:spcAft>
-                <a:spcPts val="600"/>
-              </a:spcAft>
-            </a:pPr>
-            <a:r>
-              <a:rPr lang="en-GB" dirty="0"/>
-              <a:t>Atlas for amygdala, hippocampus and thalamus</a:t>
-            </a:r>
-          </a:p>
-        </p:txBody>
-      </p:sp>
-      <p:sp>
-        <p:nvSpPr>
-          <p:cNvPr id="3" name="Titre 2"/>
-          <p:cNvSpPr>
-            <a:spLocks noGrp="1"/>
-          </p:cNvSpPr>
-          <p:nvPr>
-            <p:ph type="title"/>
-          </p:nvPr>
-        </p:nvSpPr>
-        <p:spPr/>
-        <p:txBody>
-          <a:bodyPr/>
-          <a:lstStyle/>
-          <a:p>
-            <a:r>
-              <a:rPr lang="fr-CH" dirty="0"/>
-              <a:t>Outlook</a:t>
-            </a:r>
-          </a:p>
-        </p:txBody>
-      </p:sp>
-    </p:spTree>
-    <p:extLst>
-      <p:ext uri="{BB962C8B-B14F-4D97-AF65-F5344CB8AC3E}">
-        <p14:creationId xmlns:p14="http://schemas.microsoft.com/office/powerpoint/2010/main" val="3395289792"/>
-      </p:ext>
-    </p:extLst>
-  </p:cSld>
-  <p:clrMapOvr>
-    <a:masterClrMapping/>
-  </p:clrMapOvr>
-  <p:timing>
-    <p:tnLst>
-      <p:par>
-        <p:cTn id="1" dur="indefinite" restart="never" nodeType="tmRoot"/>
-      </p:par>
-    </p:tnLst>
-  </p:timing>
 </p:sld>
 </file>
 

</xml_diff>